<commit_message>
Se resolvio el problema del determinate
</commit_message>
<xml_diff>
--- a/Presentaciones/Matrices Bidimencionales.pptx
+++ b/Presentaciones/Matrices Bidimencionales.pptx
@@ -108,6 +108,11 @@
       </a:defRPr>
     </a:lvl9pPr>
   </p:defaultTextStyle>
+  <p:extLst>
+    <p:ext uri="{EFAFB233-063F-42B5-8137-9DF3F51BA10A}">
+      <p15:sldGuideLst xmlns:p15="http://schemas.microsoft.com/office/powerpoint/2012/main"/>
+    </p:ext>
+  </p:extLst>
 </p:presentation>
 </file>
 
@@ -603,7 +608,7 @@
           </a:lstStyle>
           <a:p>
             <a:r>
-              <a:rPr lang="es-ES" smtClean="0"/>
+              <a:rPr lang="es-ES"/>
               <a:t>Haga clic para modificar el estilo de título del patrón</a:t>
             </a:r>
             <a:endParaRPr lang="en-US" dirty="0"/>
@@ -720,7 +725,7 @@
           </a:lstStyle>
           <a:p>
             <a:r>
-              <a:rPr lang="es-ES" smtClean="0"/>
+              <a:rPr lang="es-ES"/>
               <a:t>Haga clic para modificar el estilo de subtítulo del patrón</a:t>
             </a:r>
             <a:endParaRPr lang="en-US" dirty="0"/>
@@ -1704,7 +1709,7 @@
           </a:lstStyle>
           <a:p>
             <a:r>
-              <a:rPr lang="es-ES" smtClean="0"/>
+              <a:rPr lang="es-ES"/>
               <a:t>Haga clic para modificar el estilo de título del patrón</a:t>
             </a:r>
             <a:endParaRPr lang="en-US" dirty="0"/>
@@ -1783,7 +1788,7 @@
           </a:lstStyle>
           <a:p>
             <a:r>
-              <a:rPr lang="es-ES" smtClean="0"/>
+              <a:rPr lang="es-ES"/>
               <a:t>Haga clic en el icono para agregar una imagen</a:t>
             </a:r>
             <a:endParaRPr lang="en-US" dirty="0"/>
@@ -1855,7 +1860,7 @@
           <a:p>
             <a:pPr lvl="0"/>
             <a:r>
-              <a:rPr lang="es-ES" smtClean="0"/>
+              <a:rPr lang="es-ES"/>
               <a:t>Haga clic para modificar el estilo de texto del patrón</a:t>
             </a:r>
           </a:p>
@@ -2798,7 +2803,7 @@
           </a:lstStyle>
           <a:p>
             <a:r>
-              <a:rPr lang="es-ES" smtClean="0"/>
+              <a:rPr lang="es-ES"/>
               <a:t>Haga clic para modificar el estilo de título del patrón</a:t>
             </a:r>
             <a:endParaRPr lang="en-US" dirty="0"/>
@@ -2866,7 +2871,7 @@
           <a:p>
             <a:pPr lvl="0"/>
             <a:r>
-              <a:rPr lang="es-ES" smtClean="0"/>
+              <a:rPr lang="es-ES"/>
               <a:t>Haga clic para modificar el estilo de texto del patrón</a:t>
             </a:r>
           </a:p>
@@ -3895,7 +3900,7 @@
           </a:lstStyle>
           <a:p>
             <a:r>
-              <a:rPr lang="es-ES" smtClean="0"/>
+              <a:rPr lang="es-ES"/>
               <a:t>Haga clic para modificar el estilo de título del patrón</a:t>
             </a:r>
             <a:endParaRPr lang="en-US" dirty="0"/>
@@ -3969,7 +3974,7 @@
           <a:p>
             <a:pPr lvl="0"/>
             <a:r>
-              <a:rPr lang="es-ES" smtClean="0"/>
+              <a:rPr lang="es-ES"/>
               <a:t>Haga clic para modificar el estilo de texto del patrón</a:t>
             </a:r>
           </a:p>
@@ -4036,7 +4041,7 @@
           <a:p>
             <a:pPr lvl="0"/>
             <a:r>
-              <a:rPr lang="es-ES" smtClean="0"/>
+              <a:rPr lang="es-ES"/>
               <a:t>Haga clic para modificar el estilo de texto del patrón</a:t>
             </a:r>
           </a:p>
@@ -4979,7 +4984,7 @@
           </a:lstStyle>
           <a:p>
             <a:r>
-              <a:rPr lang="es-ES" smtClean="0"/>
+              <a:rPr lang="es-ES"/>
               <a:t>Haga clic para modificar el estilo de título del patrón</a:t>
             </a:r>
             <a:endParaRPr lang="en-US" dirty="0"/>
@@ -5097,7 +5102,7 @@
           <a:p>
             <a:pPr lvl="0"/>
             <a:r>
-              <a:rPr lang="es-ES" smtClean="0"/>
+              <a:rPr lang="es-ES"/>
               <a:t>Haga clic para modificar el estilo de texto del patrón</a:t>
             </a:r>
           </a:p>
@@ -5254,7 +5259,7 @@
           </a:lstStyle>
           <a:p>
             <a:r>
-              <a:rPr lang="es-ES" smtClean="0"/>
+              <a:rPr lang="es-ES"/>
               <a:t>Haga clic para modificar el estilo de título del patrón</a:t>
             </a:r>
             <a:endParaRPr lang="en-US" dirty="0"/>
@@ -5326,7 +5331,7 @@
           <a:p>
             <a:pPr lvl="0"/>
             <a:r>
-              <a:rPr lang="es-ES" smtClean="0"/>
+              <a:rPr lang="es-ES"/>
               <a:t>Haga clic para modificar el estilo de texto del patrón</a:t>
             </a:r>
           </a:p>
@@ -5393,7 +5398,7 @@
           <a:p>
             <a:pPr lvl="0"/>
             <a:r>
-              <a:rPr lang="es-ES" smtClean="0"/>
+              <a:rPr lang="es-ES"/>
               <a:t>Haga clic para modificar el estilo de texto del patrón</a:t>
             </a:r>
           </a:p>
@@ -5464,7 +5469,7 @@
           <a:p>
             <a:pPr lvl="0"/>
             <a:r>
-              <a:rPr lang="es-ES" smtClean="0"/>
+              <a:rPr lang="es-ES"/>
               <a:t>Haga clic para modificar el estilo de texto del patrón</a:t>
             </a:r>
           </a:p>
@@ -5531,7 +5536,7 @@
           <a:p>
             <a:pPr lvl="0"/>
             <a:r>
-              <a:rPr lang="es-ES" smtClean="0"/>
+              <a:rPr lang="es-ES"/>
               <a:t>Haga clic para modificar el estilo de texto del patrón</a:t>
             </a:r>
           </a:p>
@@ -5602,7 +5607,7 @@
           <a:p>
             <a:pPr lvl="0"/>
             <a:r>
-              <a:rPr lang="es-ES" smtClean="0"/>
+              <a:rPr lang="es-ES"/>
               <a:t>Haga clic para modificar el estilo de texto del patrón</a:t>
             </a:r>
           </a:p>
@@ -5669,7 +5674,7 @@
           <a:p>
             <a:pPr lvl="0"/>
             <a:r>
-              <a:rPr lang="es-ES" smtClean="0"/>
+              <a:rPr lang="es-ES"/>
               <a:t>Haga clic para modificar el estilo de texto del patrón</a:t>
             </a:r>
           </a:p>
@@ -5864,7 +5869,7 @@
           </a:lstStyle>
           <a:p>
             <a:r>
-              <a:rPr lang="es-ES" smtClean="0"/>
+              <a:rPr lang="es-ES"/>
               <a:t>Haga clic para modificar el estilo de título del patrón</a:t>
             </a:r>
             <a:endParaRPr lang="en-US" dirty="0"/>
@@ -5936,7 +5941,7 @@
           <a:p>
             <a:pPr lvl="0"/>
             <a:r>
-              <a:rPr lang="es-ES" smtClean="0"/>
+              <a:rPr lang="es-ES"/>
               <a:t>Haga clic para modificar el estilo de texto del patrón</a:t>
             </a:r>
           </a:p>
@@ -6014,7 +6019,7 @@
           </a:lstStyle>
           <a:p>
             <a:r>
-              <a:rPr lang="es-ES" smtClean="0"/>
+              <a:rPr lang="es-ES"/>
               <a:t>Haga clic en el icono para agregar una imagen</a:t>
             </a:r>
             <a:endParaRPr lang="en-US" dirty="0"/>
@@ -6082,7 +6087,7 @@
           <a:p>
             <a:pPr lvl="0"/>
             <a:r>
-              <a:rPr lang="es-ES" smtClean="0"/>
+              <a:rPr lang="es-ES"/>
               <a:t>Haga clic para modificar el estilo de texto del patrón</a:t>
             </a:r>
           </a:p>
@@ -6153,7 +6158,7 @@
           <a:p>
             <a:pPr lvl="0"/>
             <a:r>
-              <a:rPr lang="es-ES" smtClean="0"/>
+              <a:rPr lang="es-ES"/>
               <a:t>Haga clic para modificar el estilo de texto del patrón</a:t>
             </a:r>
           </a:p>
@@ -6231,7 +6236,7 @@
           </a:lstStyle>
           <a:p>
             <a:r>
-              <a:rPr lang="es-ES" smtClean="0"/>
+              <a:rPr lang="es-ES"/>
               <a:t>Haga clic en el icono para agregar una imagen</a:t>
             </a:r>
             <a:endParaRPr lang="en-US" dirty="0"/>
@@ -6299,7 +6304,7 @@
           <a:p>
             <a:pPr lvl="0"/>
             <a:r>
-              <a:rPr lang="es-ES" smtClean="0"/>
+              <a:rPr lang="es-ES"/>
               <a:t>Haga clic para modificar el estilo de texto del patrón</a:t>
             </a:r>
           </a:p>
@@ -6370,7 +6375,7 @@
           <a:p>
             <a:pPr lvl="0"/>
             <a:r>
-              <a:rPr lang="es-ES" smtClean="0"/>
+              <a:rPr lang="es-ES"/>
               <a:t>Haga clic para modificar el estilo de texto del patrón</a:t>
             </a:r>
           </a:p>
@@ -6448,7 +6453,7 @@
           </a:lstStyle>
           <a:p>
             <a:r>
-              <a:rPr lang="es-ES" smtClean="0"/>
+              <a:rPr lang="es-ES"/>
               <a:t>Haga clic en el icono para agregar una imagen</a:t>
             </a:r>
             <a:endParaRPr lang="en-US" dirty="0"/>
@@ -6516,7 +6521,7 @@
           <a:p>
             <a:pPr lvl="0"/>
             <a:r>
-              <a:rPr lang="es-ES" smtClean="0"/>
+              <a:rPr lang="es-ES"/>
               <a:t>Haga clic para modificar el estilo de texto del patrón</a:t>
             </a:r>
           </a:p>
@@ -6712,7 +6717,7 @@
           <a:lstStyle/>
           <a:p>
             <a:r>
-              <a:rPr lang="es-ES" smtClean="0"/>
+              <a:rPr lang="es-ES"/>
               <a:t>Haga clic para modificar el estilo de título del patrón</a:t>
             </a:r>
             <a:endParaRPr lang="en-US" dirty="0"/>
@@ -6736,35 +6741,35 @@
           <a:p>
             <a:pPr lvl="0"/>
             <a:r>
-              <a:rPr lang="es-ES" smtClean="0"/>
+              <a:rPr lang="es-ES"/>
               <a:t>Haga clic para modificar el estilo de texto del patrón</a:t>
             </a:r>
           </a:p>
           <a:p>
             <a:pPr lvl="1"/>
             <a:r>
-              <a:rPr lang="es-ES" smtClean="0"/>
+              <a:rPr lang="es-ES"/>
               <a:t>Segundo nivel</a:t>
             </a:r>
           </a:p>
           <a:p>
             <a:pPr lvl="2"/>
             <a:r>
-              <a:rPr lang="es-ES" smtClean="0"/>
+              <a:rPr lang="es-ES"/>
               <a:t>Tercer nivel</a:t>
             </a:r>
           </a:p>
           <a:p>
             <a:pPr lvl="3"/>
             <a:r>
-              <a:rPr lang="es-ES" smtClean="0"/>
+              <a:rPr lang="es-ES"/>
               <a:t>Cuarto nivel</a:t>
             </a:r>
           </a:p>
           <a:p>
             <a:pPr lvl="4"/>
             <a:r>
-              <a:rPr lang="es-ES" smtClean="0"/>
+              <a:rPr lang="es-ES"/>
               <a:t>Quinto nivel</a:t>
             </a:r>
             <a:endParaRPr lang="en-US" dirty="0"/>
@@ -7705,7 +7710,7 @@
           <a:lstStyle/>
           <a:p>
             <a:r>
-              <a:rPr lang="es-ES" smtClean="0"/>
+              <a:rPr lang="es-ES"/>
               <a:t>Haga clic para modificar el estilo de título del patrón</a:t>
             </a:r>
             <a:endParaRPr lang="en-US" dirty="0"/>
@@ -7734,35 +7739,35 @@
           <a:p>
             <a:pPr lvl="0"/>
             <a:r>
-              <a:rPr lang="es-ES" smtClean="0"/>
+              <a:rPr lang="es-ES"/>
               <a:t>Haga clic para modificar el estilo de texto del patrón</a:t>
             </a:r>
           </a:p>
           <a:p>
             <a:pPr lvl="1"/>
             <a:r>
-              <a:rPr lang="es-ES" smtClean="0"/>
+              <a:rPr lang="es-ES"/>
               <a:t>Segundo nivel</a:t>
             </a:r>
           </a:p>
           <a:p>
             <a:pPr lvl="2"/>
             <a:r>
-              <a:rPr lang="es-ES" smtClean="0"/>
+              <a:rPr lang="es-ES"/>
               <a:t>Tercer nivel</a:t>
             </a:r>
           </a:p>
           <a:p>
             <a:pPr lvl="3"/>
             <a:r>
-              <a:rPr lang="es-ES" smtClean="0"/>
+              <a:rPr lang="es-ES"/>
               <a:t>Cuarto nivel</a:t>
             </a:r>
           </a:p>
           <a:p>
             <a:pPr lvl="4"/>
             <a:r>
-              <a:rPr lang="es-ES" smtClean="0"/>
+              <a:rPr lang="es-ES"/>
               <a:t>Quinto nivel</a:t>
             </a:r>
             <a:endParaRPr lang="en-US" dirty="0"/>
@@ -7916,7 +7921,7 @@
           <a:lstStyle/>
           <a:p>
             <a:r>
-              <a:rPr lang="es-ES" smtClean="0"/>
+              <a:rPr lang="es-ES"/>
               <a:t>Haga clic para modificar el estilo de título del patrón</a:t>
             </a:r>
             <a:endParaRPr lang="en-US" dirty="0"/>
@@ -7940,35 +7945,35 @@
           <a:p>
             <a:pPr lvl="0"/>
             <a:r>
-              <a:rPr lang="es-ES" smtClean="0"/>
+              <a:rPr lang="es-ES"/>
               <a:t>Haga clic para modificar el estilo de texto del patrón</a:t>
             </a:r>
           </a:p>
           <a:p>
             <a:pPr lvl="1"/>
             <a:r>
-              <a:rPr lang="es-ES" smtClean="0"/>
+              <a:rPr lang="es-ES"/>
               <a:t>Segundo nivel</a:t>
             </a:r>
           </a:p>
           <a:p>
             <a:pPr lvl="2"/>
             <a:r>
-              <a:rPr lang="es-ES" smtClean="0"/>
+              <a:rPr lang="es-ES"/>
               <a:t>Tercer nivel</a:t>
             </a:r>
           </a:p>
           <a:p>
             <a:pPr lvl="3"/>
             <a:r>
-              <a:rPr lang="es-ES" smtClean="0"/>
+              <a:rPr lang="es-ES"/>
               <a:t>Cuarto nivel</a:t>
             </a:r>
           </a:p>
           <a:p>
             <a:pPr lvl="4"/>
             <a:r>
-              <a:rPr lang="es-ES" smtClean="0"/>
+              <a:rPr lang="es-ES"/>
               <a:t>Quinto nivel</a:t>
             </a:r>
             <a:endParaRPr lang="en-US" dirty="0"/>
@@ -8913,7 +8918,7 @@
           </a:lstStyle>
           <a:p>
             <a:r>
-              <a:rPr lang="es-ES" smtClean="0"/>
+              <a:rPr lang="es-ES"/>
               <a:t>Haga clic para modificar el estilo de título del patrón</a:t>
             </a:r>
             <a:endParaRPr lang="en-US" dirty="0"/>
@@ -9031,7 +9036,7 @@
           <a:p>
             <a:pPr lvl="0"/>
             <a:r>
-              <a:rPr lang="es-ES" smtClean="0"/>
+              <a:rPr lang="es-ES"/>
               <a:t>Haga clic para modificar el estilo de texto del patrón</a:t>
             </a:r>
           </a:p>
@@ -9184,7 +9189,7 @@
           <a:lstStyle/>
           <a:p>
             <a:r>
-              <a:rPr lang="es-ES" smtClean="0"/>
+              <a:rPr lang="es-ES"/>
               <a:t>Haga clic para modificar el estilo de título del patrón</a:t>
             </a:r>
             <a:endParaRPr lang="en-US" dirty="0"/>
@@ -9215,35 +9220,35 @@
           <a:p>
             <a:pPr lvl="0"/>
             <a:r>
-              <a:rPr lang="es-ES" smtClean="0"/>
+              <a:rPr lang="es-ES"/>
               <a:t>Haga clic para modificar el estilo de texto del patrón</a:t>
             </a:r>
           </a:p>
           <a:p>
             <a:pPr lvl="1"/>
             <a:r>
-              <a:rPr lang="es-ES" smtClean="0"/>
+              <a:rPr lang="es-ES"/>
               <a:t>Segundo nivel</a:t>
             </a:r>
           </a:p>
           <a:p>
             <a:pPr lvl="2"/>
             <a:r>
-              <a:rPr lang="es-ES" smtClean="0"/>
+              <a:rPr lang="es-ES"/>
               <a:t>Tercer nivel</a:t>
             </a:r>
           </a:p>
           <a:p>
             <a:pPr lvl="3"/>
             <a:r>
-              <a:rPr lang="es-ES" smtClean="0"/>
+              <a:rPr lang="es-ES"/>
               <a:t>Cuarto nivel</a:t>
             </a:r>
           </a:p>
           <a:p>
             <a:pPr lvl="4"/>
             <a:r>
-              <a:rPr lang="es-ES" smtClean="0"/>
+              <a:rPr lang="es-ES"/>
               <a:t>Quinto nivel</a:t>
             </a:r>
             <a:endParaRPr lang="en-US" dirty="0"/>
@@ -9274,35 +9279,35 @@
           <a:p>
             <a:pPr lvl="0"/>
             <a:r>
-              <a:rPr lang="es-ES" smtClean="0"/>
+              <a:rPr lang="es-ES"/>
               <a:t>Haga clic para modificar el estilo de texto del patrón</a:t>
             </a:r>
           </a:p>
           <a:p>
             <a:pPr lvl="1"/>
             <a:r>
-              <a:rPr lang="es-ES" smtClean="0"/>
+              <a:rPr lang="es-ES"/>
               <a:t>Segundo nivel</a:t>
             </a:r>
           </a:p>
           <a:p>
             <a:pPr lvl="2"/>
             <a:r>
-              <a:rPr lang="es-ES" smtClean="0"/>
+              <a:rPr lang="es-ES"/>
               <a:t>Tercer nivel</a:t>
             </a:r>
           </a:p>
           <a:p>
             <a:pPr lvl="3"/>
             <a:r>
-              <a:rPr lang="es-ES" smtClean="0"/>
+              <a:rPr lang="es-ES"/>
               <a:t>Cuarto nivel</a:t>
             </a:r>
           </a:p>
           <a:p>
             <a:pPr lvl="4"/>
             <a:r>
-              <a:rPr lang="es-ES" smtClean="0"/>
+              <a:rPr lang="es-ES"/>
               <a:t>Quinto nivel</a:t>
             </a:r>
             <a:endParaRPr lang="en-US" dirty="0"/>
@@ -9424,7 +9429,7 @@
           </a:lstStyle>
           <a:p>
             <a:r>
-              <a:rPr lang="es-ES" smtClean="0"/>
+              <a:rPr lang="es-ES"/>
               <a:t>Haga clic para modificar el estilo de título del patrón</a:t>
             </a:r>
             <a:endParaRPr lang="en-US" dirty="0"/>
@@ -9496,7 +9501,7 @@
           <a:p>
             <a:pPr lvl="0"/>
             <a:r>
-              <a:rPr lang="es-ES" smtClean="0"/>
+              <a:rPr lang="es-ES"/>
               <a:t>Haga clic para modificar el estilo de texto del patrón</a:t>
             </a:r>
           </a:p>
@@ -9526,35 +9531,35 @@
           <a:p>
             <a:pPr lvl="0"/>
             <a:r>
-              <a:rPr lang="es-ES" smtClean="0"/>
+              <a:rPr lang="es-ES"/>
               <a:t>Haga clic para modificar el estilo de texto del patrón</a:t>
             </a:r>
           </a:p>
           <a:p>
             <a:pPr lvl="1"/>
             <a:r>
-              <a:rPr lang="es-ES" smtClean="0"/>
+              <a:rPr lang="es-ES"/>
               <a:t>Segundo nivel</a:t>
             </a:r>
           </a:p>
           <a:p>
             <a:pPr lvl="2"/>
             <a:r>
-              <a:rPr lang="es-ES" smtClean="0"/>
+              <a:rPr lang="es-ES"/>
               <a:t>Tercer nivel</a:t>
             </a:r>
           </a:p>
           <a:p>
             <a:pPr lvl="3"/>
             <a:r>
-              <a:rPr lang="es-ES" smtClean="0"/>
+              <a:rPr lang="es-ES"/>
               <a:t>Cuarto nivel</a:t>
             </a:r>
           </a:p>
           <a:p>
             <a:pPr lvl="4"/>
             <a:r>
-              <a:rPr lang="es-ES" smtClean="0"/>
+              <a:rPr lang="es-ES"/>
               <a:t>Quinto nivel</a:t>
             </a:r>
             <a:endParaRPr lang="en-US" dirty="0"/>
@@ -9626,7 +9631,7 @@
           <a:p>
             <a:pPr lvl="0"/>
             <a:r>
-              <a:rPr lang="es-ES" smtClean="0"/>
+              <a:rPr lang="es-ES"/>
               <a:t>Haga clic para modificar el estilo de texto del patrón</a:t>
             </a:r>
           </a:p>
@@ -9656,35 +9661,35 @@
           <a:p>
             <a:pPr lvl="0"/>
             <a:r>
-              <a:rPr lang="es-ES" smtClean="0"/>
+              <a:rPr lang="es-ES"/>
               <a:t>Haga clic para modificar el estilo de texto del patrón</a:t>
             </a:r>
           </a:p>
           <a:p>
             <a:pPr lvl="1"/>
             <a:r>
-              <a:rPr lang="es-ES" smtClean="0"/>
+              <a:rPr lang="es-ES"/>
               <a:t>Segundo nivel</a:t>
             </a:r>
           </a:p>
           <a:p>
             <a:pPr lvl="2"/>
             <a:r>
-              <a:rPr lang="es-ES" smtClean="0"/>
+              <a:rPr lang="es-ES"/>
               <a:t>Tercer nivel</a:t>
             </a:r>
           </a:p>
           <a:p>
             <a:pPr lvl="3"/>
             <a:r>
-              <a:rPr lang="es-ES" smtClean="0"/>
+              <a:rPr lang="es-ES"/>
               <a:t>Cuarto nivel</a:t>
             </a:r>
           </a:p>
           <a:p>
             <a:pPr lvl="4"/>
             <a:r>
-              <a:rPr lang="es-ES" smtClean="0"/>
+              <a:rPr lang="es-ES"/>
               <a:t>Quinto nivel</a:t>
             </a:r>
             <a:endParaRPr lang="en-US" dirty="0"/>
@@ -9802,7 +9807,7 @@
           <a:lstStyle/>
           <a:p>
             <a:r>
-              <a:rPr lang="es-ES" smtClean="0"/>
+              <a:rPr lang="es-ES"/>
               <a:t>Haga clic para modificar el estilo de título del patrón</a:t>
             </a:r>
             <a:endParaRPr lang="en-US" dirty="0"/>
@@ -10878,7 +10883,7 @@
           </a:lstStyle>
           <a:p>
             <a:r>
-              <a:rPr lang="es-ES" smtClean="0"/>
+              <a:rPr lang="es-ES"/>
               <a:t>Haga clic para modificar el estilo de título del patrón</a:t>
             </a:r>
             <a:endParaRPr lang="en-US" dirty="0"/>
@@ -10909,35 +10914,35 @@
           <a:p>
             <a:pPr lvl="0"/>
             <a:r>
-              <a:rPr lang="es-ES" smtClean="0"/>
+              <a:rPr lang="es-ES"/>
               <a:t>Haga clic para modificar el estilo de texto del patrón</a:t>
             </a:r>
           </a:p>
           <a:p>
             <a:pPr lvl="1"/>
             <a:r>
-              <a:rPr lang="es-ES" smtClean="0"/>
+              <a:rPr lang="es-ES"/>
               <a:t>Segundo nivel</a:t>
             </a:r>
           </a:p>
           <a:p>
             <a:pPr lvl="2"/>
             <a:r>
-              <a:rPr lang="es-ES" smtClean="0"/>
+              <a:rPr lang="es-ES"/>
               <a:t>Tercer nivel</a:t>
             </a:r>
           </a:p>
           <a:p>
             <a:pPr lvl="3"/>
             <a:r>
-              <a:rPr lang="es-ES" smtClean="0"/>
+              <a:rPr lang="es-ES"/>
               <a:t>Cuarto nivel</a:t>
             </a:r>
           </a:p>
           <a:p>
             <a:pPr lvl="4"/>
             <a:r>
-              <a:rPr lang="es-ES" smtClean="0"/>
+              <a:rPr lang="es-ES"/>
               <a:t>Quinto nivel</a:t>
             </a:r>
             <a:endParaRPr lang="en-US" dirty="0"/>
@@ -11007,7 +11012,7 @@
           <a:p>
             <a:pPr lvl="0"/>
             <a:r>
-              <a:rPr lang="es-ES" smtClean="0"/>
+              <a:rPr lang="es-ES"/>
               <a:t>Haga clic para modificar el estilo de texto del patrón</a:t>
             </a:r>
           </a:p>
@@ -11989,7 +11994,7 @@
           </a:lstStyle>
           <a:p>
             <a:r>
-              <a:rPr lang="es-ES" smtClean="0"/>
+              <a:rPr lang="es-ES"/>
               <a:t>Haga clic para modificar el estilo de título del patrón</a:t>
             </a:r>
             <a:endParaRPr lang="en-US" dirty="0"/>
@@ -12068,7 +12073,7 @@
           </a:lstStyle>
           <a:p>
             <a:r>
-              <a:rPr lang="es-ES" smtClean="0"/>
+              <a:rPr lang="es-ES"/>
               <a:t>Haga clic en el icono para agregar una imagen</a:t>
             </a:r>
             <a:endParaRPr lang="en-US" dirty="0"/>
@@ -12140,7 +12145,7 @@
           <a:p>
             <a:pPr lvl="0"/>
             <a:r>
-              <a:rPr lang="es-ES" smtClean="0"/>
+              <a:rPr lang="es-ES"/>
               <a:t>Haga clic para modificar el estilo de texto del patrón</a:t>
             </a:r>
           </a:p>
@@ -13089,7 +13094,7 @@
           <a:lstStyle/>
           <a:p>
             <a:r>
-              <a:rPr lang="es-ES" smtClean="0"/>
+              <a:rPr lang="es-ES"/>
               <a:t>Haga clic para modificar el estilo de título del patrón</a:t>
             </a:r>
             <a:endParaRPr lang="en-US" dirty="0"/>
@@ -13123,35 +13128,35 @@
           <a:p>
             <a:pPr lvl="0"/>
             <a:r>
-              <a:rPr lang="es-ES" smtClean="0"/>
+              <a:rPr lang="es-ES"/>
               <a:t>Haga clic para modificar el estilo de texto del patrón</a:t>
             </a:r>
           </a:p>
           <a:p>
             <a:pPr lvl="1"/>
             <a:r>
-              <a:rPr lang="es-ES" smtClean="0"/>
+              <a:rPr lang="es-ES"/>
               <a:t>Segundo nivel</a:t>
             </a:r>
           </a:p>
           <a:p>
             <a:pPr lvl="2"/>
             <a:r>
-              <a:rPr lang="es-ES" smtClean="0"/>
+              <a:rPr lang="es-ES"/>
               <a:t>Tercer nivel</a:t>
             </a:r>
           </a:p>
           <a:p>
             <a:pPr lvl="3"/>
             <a:r>
-              <a:rPr lang="es-ES" smtClean="0"/>
+              <a:rPr lang="es-ES"/>
               <a:t>Cuarto nivel</a:t>
             </a:r>
           </a:p>
           <a:p>
             <a:pPr lvl="4"/>
             <a:r>
-              <a:rPr lang="es-ES" smtClean="0"/>
+              <a:rPr lang="es-ES"/>
               <a:t>Quinto nivel</a:t>
             </a:r>
             <a:endParaRPr lang="en-US" dirty="0"/>
@@ -13769,11 +13774,11 @@
           <a:lstStyle/>
           <a:p>
             <a:r>
-              <a:rPr lang="es-MX" dirty="0" smtClean="0"/>
+              <a:rPr lang="es-MX" dirty="0"/>
               <a:t>Matrices </a:t>
             </a:r>
             <a:r>
-              <a:rPr lang="es-MX" dirty="0" err="1" smtClean="0"/>
+              <a:rPr lang="es-MX" dirty="0" err="1"/>
               <a:t>Bidimencionales</a:t>
             </a:r>
             <a:endParaRPr lang="es-ES" dirty="0"/>
@@ -13796,7 +13801,7 @@
           <a:lstStyle/>
           <a:p>
             <a:r>
-              <a:rPr lang="es-MX" dirty="0" smtClean="0"/>
+              <a:rPr lang="es-MX" dirty="0"/>
               <a:t>Operaciones Fundamentales</a:t>
             </a:r>
             <a:endParaRPr lang="es-ES" dirty="0"/>
@@ -13813,13 +13818,6 @@
   <p:clrMapOvr>
     <a:masterClrMapping/>
   </p:clrMapOvr>
-  <p:timing>
-    <p:tnLst>
-      <p:par>
-        <p:cTn id="1" dur="indefinite" restart="never" nodeType="tmRoot"/>
-      </p:par>
-    </p:tnLst>
-  </p:timing>
 </p:sld>
 </file>
 
@@ -13856,7 +13854,7 @@
           <a:lstStyle/>
           <a:p>
             <a:r>
-              <a:rPr lang="es-MX" dirty="0" smtClean="0"/>
+              <a:rPr lang="es-MX" dirty="0"/>
               <a:t>Determinante</a:t>
             </a:r>
             <a:endParaRPr lang="es-ES" dirty="0"/>
@@ -13873,14 +13871,14 @@
             <p:ph idx="1"/>
             <p:extLst>
               <p:ext uri="{D42A27DB-BD31-4B8C-83A1-F6EECF244321}">
-                <p14:modId xmlns:p14="http://schemas.microsoft.com/office/powerpoint/2010/main" val="4094208819"/>
+                <p14:modId xmlns:p14="http://schemas.microsoft.com/office/powerpoint/2010/main" val="3657483710"/>
               </p:ext>
             </p:extLst>
           </p:nvPr>
         </p:nvGraphicFramePr>
         <p:xfrm>
           <a:off x="550395" y="2964103"/>
-          <a:ext cx="2463260" cy="1646536"/>
+          <a:ext cx="2450257" cy="1646536"/>
         </p:xfrm>
         <a:graphic>
           <a:graphicData uri="http://schemas.openxmlformats.org/drawingml/2006/table">
@@ -13889,10 +13887,34 @@
                 <a:tableStyleId>{3B4B98B0-60AC-42C2-AFA5-B58CD77FA1E5}</a:tableStyleId>
               </a:tblPr>
               <a:tblGrid>
-                <a:gridCol w="615815"/>
-                <a:gridCol w="615815"/>
-                <a:gridCol w="615815"/>
-                <a:gridCol w="615815"/>
+                <a:gridCol w="615815">
+                  <a:extLst>
+                    <a:ext uri="{9D8B030D-6E8A-4147-A177-3AD203B41FA5}">
+                      <a16:colId xmlns:a16="http://schemas.microsoft.com/office/drawing/2014/main" val="20000"/>
+                    </a:ext>
+                  </a:extLst>
+                </a:gridCol>
+                <a:gridCol w="615815">
+                  <a:extLst>
+                    <a:ext uri="{9D8B030D-6E8A-4147-A177-3AD203B41FA5}">
+                      <a16:colId xmlns:a16="http://schemas.microsoft.com/office/drawing/2014/main" val="20001"/>
+                    </a:ext>
+                  </a:extLst>
+                </a:gridCol>
+                <a:gridCol w="615815">
+                  <a:extLst>
+                    <a:ext uri="{9D8B030D-6E8A-4147-A177-3AD203B41FA5}">
+                      <a16:colId xmlns:a16="http://schemas.microsoft.com/office/drawing/2014/main" val="20002"/>
+                    </a:ext>
+                  </a:extLst>
+                </a:gridCol>
+                <a:gridCol w="602812">
+                  <a:extLst>
+                    <a:ext uri="{9D8B030D-6E8A-4147-A177-3AD203B41FA5}">
+                      <a16:colId xmlns:a16="http://schemas.microsoft.com/office/drawing/2014/main" val="20003"/>
+                    </a:ext>
+                  </a:extLst>
+                </a:gridCol>
               </a:tblGrid>
               <a:tr h="411634">
                 <a:tc>
@@ -13956,7 +13978,7 @@
                     <a:p>
                       <a:pPr algn="ctr"/>
                       <a:r>
-                        <a:rPr lang="es-MX" b="1" dirty="0" smtClean="0"/>
+                        <a:rPr lang="es-MX" b="1" dirty="0"/>
                         <a:t>1</a:t>
                       </a:r>
                       <a:endParaRPr lang="es-ES" b="1" dirty="0"/>
@@ -14014,7 +14036,7 @@
                     <a:p>
                       <a:pPr algn="ctr"/>
                       <a:r>
-                        <a:rPr lang="es-MX" b="1" dirty="0" smtClean="0"/>
+                        <a:rPr lang="es-MX" b="1" dirty="0"/>
                         <a:t>2</a:t>
                       </a:r>
                       <a:endParaRPr lang="es-ES" b="1" dirty="0"/>
@@ -14072,7 +14094,7 @@
                     <a:p>
                       <a:pPr algn="ctr"/>
                       <a:r>
-                        <a:rPr lang="es-MX" b="1" dirty="0" smtClean="0"/>
+                        <a:rPr lang="es-MX" b="1" dirty="0"/>
                         <a:t>3</a:t>
                       </a:r>
                       <a:endParaRPr lang="es-ES" b="1" dirty="0"/>
@@ -14123,6 +14145,11 @@
                     </a:solidFill>
                   </a:tcPr>
                 </a:tc>
+                <a:extLst>
+                  <a:ext uri="{0D108BD9-81ED-4DB2-BD59-A6C34878D82A}">
+                    <a16:rowId xmlns:a16="http://schemas.microsoft.com/office/drawing/2014/main" val="10000"/>
+                  </a:ext>
+                </a:extLst>
               </a:tr>
               <a:tr h="411634">
                 <a:tc>
@@ -14132,7 +14159,7 @@
                     <a:p>
                       <a:pPr algn="ctr"/>
                       <a:r>
-                        <a:rPr lang="es-MX" b="1" dirty="0" smtClean="0"/>
+                        <a:rPr lang="es-MX" b="1" dirty="0"/>
                         <a:t>1</a:t>
                       </a:r>
                       <a:endParaRPr lang="es-ES" b="1" dirty="0"/>
@@ -14190,7 +14217,7 @@
                     <a:p>
                       <a:pPr algn="ctr"/>
                       <a:r>
-                        <a:rPr lang="es-MX" b="1" dirty="0" smtClean="0"/>
+                        <a:rPr lang="es-MX" b="1" dirty="0"/>
                         <a:t>4</a:t>
                       </a:r>
                       <a:endParaRPr lang="es-ES" b="1" dirty="0"/>
@@ -14242,7 +14269,7 @@
                     <a:p>
                       <a:pPr algn="ctr"/>
                       <a:r>
-                        <a:rPr lang="es-MX" b="1" dirty="0" smtClean="0"/>
+                        <a:rPr lang="es-MX" b="1" dirty="0"/>
                         <a:t>5</a:t>
                       </a:r>
                       <a:endParaRPr lang="es-ES" b="1" dirty="0"/>
@@ -14294,7 +14321,7 @@
                     <a:p>
                       <a:pPr algn="ctr"/>
                       <a:r>
-                        <a:rPr lang="es-MX" b="1" dirty="0" smtClean="0"/>
+                        <a:rPr lang="es-MX" b="1" dirty="0"/>
                         <a:t>7</a:t>
                       </a:r>
                       <a:endParaRPr lang="es-ES" b="1" dirty="0"/>
@@ -14339,6 +14366,11 @@
                     </a:lnB>
                   </a:tcPr>
                 </a:tc>
+                <a:extLst>
+                  <a:ext uri="{0D108BD9-81ED-4DB2-BD59-A6C34878D82A}">
+                    <a16:rowId xmlns:a16="http://schemas.microsoft.com/office/drawing/2014/main" val="10001"/>
+                  </a:ext>
+                </a:extLst>
               </a:tr>
               <a:tr h="411634">
                 <a:tc>
@@ -14348,7 +14380,7 @@
                     <a:p>
                       <a:pPr algn="ctr"/>
                       <a:r>
-                        <a:rPr lang="es-MX" b="1" dirty="0" smtClean="0"/>
+                        <a:rPr lang="es-MX" b="1" dirty="0"/>
                         <a:t>2</a:t>
                       </a:r>
                       <a:endParaRPr lang="es-ES" b="1" dirty="0"/>
@@ -14406,7 +14438,7 @@
                     <a:p>
                       <a:pPr algn="ctr"/>
                       <a:r>
-                        <a:rPr lang="es-MX" b="1" dirty="0" smtClean="0"/>
+                        <a:rPr lang="es-MX" b="1" dirty="0"/>
                         <a:t>1</a:t>
                       </a:r>
                       <a:endParaRPr lang="es-ES" b="1" dirty="0"/>
@@ -14458,7 +14490,7 @@
                     <a:p>
                       <a:pPr algn="ctr"/>
                       <a:r>
-                        <a:rPr lang="es-MX" b="1" dirty="0" smtClean="0"/>
+                        <a:rPr lang="es-MX" b="1" dirty="0"/>
                         <a:t>5</a:t>
                       </a:r>
                       <a:endParaRPr lang="es-ES" b="1" dirty="0"/>
@@ -14510,7 +14542,7 @@
                     <a:p>
                       <a:pPr algn="ctr"/>
                       <a:r>
-                        <a:rPr lang="es-MX" b="1" dirty="0" smtClean="0"/>
+                        <a:rPr lang="es-MX" b="1" dirty="0"/>
                         <a:t>6</a:t>
                       </a:r>
                       <a:endParaRPr lang="es-ES" b="1" dirty="0"/>
@@ -14555,6 +14587,11 @@
                     </a:lnB>
                   </a:tcPr>
                 </a:tc>
+                <a:extLst>
+                  <a:ext uri="{0D108BD9-81ED-4DB2-BD59-A6C34878D82A}">
+                    <a16:rowId xmlns:a16="http://schemas.microsoft.com/office/drawing/2014/main" val="10002"/>
+                  </a:ext>
+                </a:extLst>
               </a:tr>
               <a:tr h="411634">
                 <a:tc>
@@ -14564,7 +14601,7 @@
                     <a:p>
                       <a:pPr algn="ctr"/>
                       <a:r>
-                        <a:rPr lang="es-MX" b="1" dirty="0" smtClean="0"/>
+                        <a:rPr lang="es-MX" b="1" dirty="0"/>
                         <a:t>3</a:t>
                       </a:r>
                     </a:p>
@@ -14621,7 +14658,7 @@
                     <a:p>
                       <a:pPr algn="ctr"/>
                       <a:r>
-                        <a:rPr lang="es-MX" b="1" dirty="0" smtClean="0"/>
+                        <a:rPr lang="es-MX" b="1" dirty="0"/>
                         <a:t>0</a:t>
                       </a:r>
                       <a:endParaRPr lang="es-ES" b="1" dirty="0"/>
@@ -14673,7 +14710,7 @@
                     <a:p>
                       <a:pPr algn="ctr"/>
                       <a:r>
-                        <a:rPr lang="es-MX" b="1" dirty="0" smtClean="0"/>
+                        <a:rPr lang="es-MX" b="1" dirty="0"/>
                         <a:t>1</a:t>
                       </a:r>
                       <a:endParaRPr lang="es-ES" b="1" dirty="0"/>
@@ -14725,7 +14762,7 @@
                     <a:p>
                       <a:pPr algn="ctr"/>
                       <a:r>
-                        <a:rPr lang="es-MX" b="1" dirty="0" smtClean="0"/>
+                        <a:rPr lang="es-MX" b="1" dirty="0"/>
                         <a:t>2</a:t>
                       </a:r>
                       <a:endParaRPr lang="es-ES" b="1" dirty="0"/>
@@ -14770,6 +14807,11 @@
                     </a:lnB>
                   </a:tcPr>
                 </a:tc>
+                <a:extLst>
+                  <a:ext uri="{0D108BD9-81ED-4DB2-BD59-A6C34878D82A}">
+                    <a16:rowId xmlns:a16="http://schemas.microsoft.com/office/drawing/2014/main" val="10003"/>
+                  </a:ext>
+                </a:extLst>
               </a:tr>
             </a:tbl>
           </a:graphicData>
@@ -14783,7 +14825,7 @@
         </p:nvSpPr>
         <p:spPr>
           <a:xfrm>
-            <a:off x="1340445" y="2964104"/>
+            <a:off x="1975827" y="2964101"/>
             <a:ext cx="279360" cy="1646535"/>
           </a:xfrm>
           <a:prstGeom prst="rect">
@@ -15007,7 +15049,13 @@
                 <a:tableStyleId>{BC89EF96-8CEA-46FF-86C4-4CE0E7609802}</a:tableStyleId>
               </a:tblPr>
               <a:tblGrid>
-                <a:gridCol w="476709"/>
+                <a:gridCol w="476709">
+                  <a:extLst>
+                    <a:ext uri="{9D8B030D-6E8A-4147-A177-3AD203B41FA5}">
+                      <a16:colId xmlns:a16="http://schemas.microsoft.com/office/drawing/2014/main" val="20000"/>
+                    </a:ext>
+                  </a:extLst>
+                </a:gridCol>
               </a:tblGrid>
               <a:tr h="489397">
                 <a:tc>
@@ -15017,7 +15065,7 @@
                     <a:p>
                       <a:pPr algn="ctr"/>
                       <a:r>
-                        <a:rPr lang="es-MX" dirty="0" smtClean="0"/>
+                        <a:rPr lang="es-MX" dirty="0"/>
                         <a:t>4</a:t>
                       </a:r>
                       <a:endParaRPr lang="es-ES" dirty="0"/>
@@ -15025,6 +15073,11 @@
                   </a:txBody>
                   <a:tcPr anchor="ctr"/>
                 </a:tc>
+                <a:extLst>
+                  <a:ext uri="{0D108BD9-81ED-4DB2-BD59-A6C34878D82A}">
+                    <a16:rowId xmlns:a16="http://schemas.microsoft.com/office/drawing/2014/main" val="10000"/>
+                  </a:ext>
+                </a:extLst>
               </a:tr>
             </a:tbl>
           </a:graphicData>
@@ -15090,8 +15143,20 @@
                 <a:tableStyleId>{3B4B98B0-60AC-42C2-AFA5-B58CD77FA1E5}</a:tableStyleId>
               </a:tblPr>
               <a:tblGrid>
-                <a:gridCol w="615815"/>
-                <a:gridCol w="615815"/>
+                <a:gridCol w="615815">
+                  <a:extLst>
+                    <a:ext uri="{9D8B030D-6E8A-4147-A177-3AD203B41FA5}">
+                      <a16:colId xmlns:a16="http://schemas.microsoft.com/office/drawing/2014/main" val="20000"/>
+                    </a:ext>
+                  </a:extLst>
+                </a:gridCol>
+                <a:gridCol w="615815">
+                  <a:extLst>
+                    <a:ext uri="{9D8B030D-6E8A-4147-A177-3AD203B41FA5}">
+                      <a16:colId xmlns:a16="http://schemas.microsoft.com/office/drawing/2014/main" val="20001"/>
+                    </a:ext>
+                  </a:extLst>
+                </a:gridCol>
               </a:tblGrid>
               <a:tr h="411634">
                 <a:tc>
@@ -15101,7 +15166,7 @@
                     <a:p>
                       <a:pPr algn="ctr"/>
                       <a:r>
-                        <a:rPr lang="es-MX" b="1" dirty="0" smtClean="0"/>
+                        <a:rPr lang="es-MX" b="1" dirty="0"/>
                         <a:t>5</a:t>
                       </a:r>
                       <a:endParaRPr lang="es-ES" b="1" dirty="0"/>
@@ -15153,7 +15218,7 @@
                     <a:p>
                       <a:pPr algn="ctr"/>
                       <a:r>
-                        <a:rPr lang="es-MX" b="1" dirty="0" smtClean="0"/>
+                        <a:rPr lang="es-MX" b="1" dirty="0"/>
                         <a:t>6</a:t>
                       </a:r>
                       <a:endParaRPr lang="es-ES" b="1" dirty="0"/>
@@ -15198,6 +15263,11 @@
                     </a:lnB>
                   </a:tcPr>
                 </a:tc>
+                <a:extLst>
+                  <a:ext uri="{0D108BD9-81ED-4DB2-BD59-A6C34878D82A}">
+                    <a16:rowId xmlns:a16="http://schemas.microsoft.com/office/drawing/2014/main" val="10000"/>
+                  </a:ext>
+                </a:extLst>
               </a:tr>
               <a:tr h="411634">
                 <a:tc>
@@ -15207,7 +15277,7 @@
                     <a:p>
                       <a:pPr algn="ctr"/>
                       <a:r>
-                        <a:rPr lang="es-MX" b="1" dirty="0" smtClean="0"/>
+                        <a:rPr lang="es-MX" b="1" dirty="0"/>
                         <a:t>1</a:t>
                       </a:r>
                       <a:endParaRPr lang="es-ES" b="1" dirty="0"/>
@@ -15259,7 +15329,7 @@
                     <a:p>
                       <a:pPr algn="ctr"/>
                       <a:r>
-                        <a:rPr lang="es-MX" b="1" dirty="0" smtClean="0"/>
+                        <a:rPr lang="es-MX" b="1" dirty="0"/>
                         <a:t>2</a:t>
                       </a:r>
                       <a:endParaRPr lang="es-ES" b="1" dirty="0"/>
@@ -15304,6 +15374,11 @@
                     </a:lnB>
                   </a:tcPr>
                 </a:tc>
+                <a:extLst>
+                  <a:ext uri="{0D108BD9-81ED-4DB2-BD59-A6C34878D82A}">
+                    <a16:rowId xmlns:a16="http://schemas.microsoft.com/office/drawing/2014/main" val="10001"/>
+                  </a:ext>
+                </a:extLst>
               </a:tr>
             </a:tbl>
           </a:graphicData>
@@ -15334,8 +15409,20 @@
                 <a:tableStyleId>{3B4B98B0-60AC-42C2-AFA5-B58CD77FA1E5}</a:tableStyleId>
               </a:tblPr>
               <a:tblGrid>
-                <a:gridCol w="615815"/>
-                <a:gridCol w="615815"/>
+                <a:gridCol w="615815">
+                  <a:extLst>
+                    <a:ext uri="{9D8B030D-6E8A-4147-A177-3AD203B41FA5}">
+                      <a16:colId xmlns:a16="http://schemas.microsoft.com/office/drawing/2014/main" val="20000"/>
+                    </a:ext>
+                  </a:extLst>
+                </a:gridCol>
+                <a:gridCol w="615815">
+                  <a:extLst>
+                    <a:ext uri="{9D8B030D-6E8A-4147-A177-3AD203B41FA5}">
+                      <a16:colId xmlns:a16="http://schemas.microsoft.com/office/drawing/2014/main" val="20001"/>
+                    </a:ext>
+                  </a:extLst>
+                </a:gridCol>
               </a:tblGrid>
               <a:tr h="298760">
                 <a:tc>
@@ -15345,7 +15432,7 @@
                     <a:p>
                       <a:pPr algn="ctr"/>
                       <a:r>
-                        <a:rPr lang="es-MX" b="1" dirty="0" smtClean="0"/>
+                        <a:rPr lang="es-MX" b="1" dirty="0"/>
                         <a:t>1</a:t>
                       </a:r>
                       <a:endParaRPr lang="es-ES" b="1" dirty="0"/>
@@ -15397,7 +15484,7 @@
                     <a:p>
                       <a:pPr algn="ctr"/>
                       <a:r>
-                        <a:rPr lang="es-MX" b="1" dirty="0" smtClean="0"/>
+                        <a:rPr lang="es-MX" b="1" dirty="0"/>
                         <a:t>6</a:t>
                       </a:r>
                       <a:endParaRPr lang="es-ES" b="1" dirty="0"/>
@@ -15442,6 +15529,11 @@
                     </a:lnB>
                   </a:tcPr>
                 </a:tc>
+                <a:extLst>
+                  <a:ext uri="{0D108BD9-81ED-4DB2-BD59-A6C34878D82A}">
+                    <a16:rowId xmlns:a16="http://schemas.microsoft.com/office/drawing/2014/main" val="10000"/>
+                  </a:ext>
+                </a:extLst>
               </a:tr>
               <a:tr h="411634">
                 <a:tc>
@@ -15451,7 +15543,7 @@
                     <a:p>
                       <a:pPr algn="ctr"/>
                       <a:r>
-                        <a:rPr lang="es-MX" b="1" dirty="0" smtClean="0"/>
+                        <a:rPr lang="es-MX" b="1" dirty="0"/>
                         <a:t>0</a:t>
                       </a:r>
                       <a:endParaRPr lang="es-ES" b="1" dirty="0"/>
@@ -15503,7 +15595,7 @@
                     <a:p>
                       <a:pPr algn="ctr"/>
                       <a:r>
-                        <a:rPr lang="es-MX" b="1" dirty="0" smtClean="0"/>
+                        <a:rPr lang="es-MX" b="1" dirty="0"/>
                         <a:t>2</a:t>
                       </a:r>
                       <a:endParaRPr lang="es-ES" b="1" dirty="0"/>
@@ -15548,6 +15640,11 @@
                     </a:lnB>
                   </a:tcPr>
                 </a:tc>
+                <a:extLst>
+                  <a:ext uri="{0D108BD9-81ED-4DB2-BD59-A6C34878D82A}">
+                    <a16:rowId xmlns:a16="http://schemas.microsoft.com/office/drawing/2014/main" val="10001"/>
+                  </a:ext>
+                </a:extLst>
               </a:tr>
             </a:tbl>
           </a:graphicData>
@@ -15578,8 +15675,20 @@
                 <a:tableStyleId>{3B4B98B0-60AC-42C2-AFA5-B58CD77FA1E5}</a:tableStyleId>
               </a:tblPr>
               <a:tblGrid>
-                <a:gridCol w="615815"/>
-                <a:gridCol w="615815"/>
+                <a:gridCol w="615815">
+                  <a:extLst>
+                    <a:ext uri="{9D8B030D-6E8A-4147-A177-3AD203B41FA5}">
+                      <a16:colId xmlns:a16="http://schemas.microsoft.com/office/drawing/2014/main" val="20000"/>
+                    </a:ext>
+                  </a:extLst>
+                </a:gridCol>
+                <a:gridCol w="615815">
+                  <a:extLst>
+                    <a:ext uri="{9D8B030D-6E8A-4147-A177-3AD203B41FA5}">
+                      <a16:colId xmlns:a16="http://schemas.microsoft.com/office/drawing/2014/main" val="20001"/>
+                    </a:ext>
+                  </a:extLst>
+                </a:gridCol>
               </a:tblGrid>
               <a:tr h="411634">
                 <a:tc>
@@ -15589,7 +15698,7 @@
                     <a:p>
                       <a:pPr algn="ctr"/>
                       <a:r>
-                        <a:rPr lang="es-MX" b="1" dirty="0" smtClean="0"/>
+                        <a:rPr lang="es-MX" b="1" dirty="0"/>
                         <a:t>1</a:t>
                       </a:r>
                       <a:endParaRPr lang="es-ES" b="1" dirty="0"/>
@@ -15641,7 +15750,7 @@
                     <a:p>
                       <a:pPr algn="ctr"/>
                       <a:r>
-                        <a:rPr lang="es-MX" b="1" dirty="0" smtClean="0"/>
+                        <a:rPr lang="es-MX" b="1" dirty="0"/>
                         <a:t>5</a:t>
                       </a:r>
                       <a:endParaRPr lang="es-ES" b="1" dirty="0"/>
@@ -15686,6 +15795,11 @@
                     </a:lnB>
                   </a:tcPr>
                 </a:tc>
+                <a:extLst>
+                  <a:ext uri="{0D108BD9-81ED-4DB2-BD59-A6C34878D82A}">
+                    <a16:rowId xmlns:a16="http://schemas.microsoft.com/office/drawing/2014/main" val="10000"/>
+                  </a:ext>
+                </a:extLst>
               </a:tr>
               <a:tr h="411634">
                 <a:tc>
@@ -15695,7 +15809,7 @@
                     <a:p>
                       <a:pPr algn="ctr"/>
                       <a:r>
-                        <a:rPr lang="es-MX" b="1" dirty="0" smtClean="0"/>
+                        <a:rPr lang="es-MX" b="1" dirty="0"/>
                         <a:t>0</a:t>
                       </a:r>
                       <a:endParaRPr lang="es-ES" b="1" dirty="0"/>
@@ -15747,7 +15861,7 @@
                     <a:p>
                       <a:pPr algn="ctr"/>
                       <a:r>
-                        <a:rPr lang="es-MX" b="1" dirty="0" smtClean="0"/>
+                        <a:rPr lang="es-MX" b="1" dirty="0"/>
                         <a:t>1</a:t>
                       </a:r>
                       <a:endParaRPr lang="es-ES" b="1" dirty="0"/>
@@ -15792,6 +15906,11 @@
                     </a:lnB>
                   </a:tcPr>
                 </a:tc>
+                <a:extLst>
+                  <a:ext uri="{0D108BD9-81ED-4DB2-BD59-A6C34878D82A}">
+                    <a16:rowId xmlns:a16="http://schemas.microsoft.com/office/drawing/2014/main" val="10001"/>
+                  </a:ext>
+                </a:extLst>
               </a:tr>
             </a:tbl>
           </a:graphicData>
@@ -15857,7 +15976,13 @@
                 <a:tableStyleId>{BC89EF96-8CEA-46FF-86C4-4CE0E7609802}</a:tableStyleId>
               </a:tblPr>
               <a:tblGrid>
-                <a:gridCol w="476709"/>
+                <a:gridCol w="476709">
+                  <a:extLst>
+                    <a:ext uri="{9D8B030D-6E8A-4147-A177-3AD203B41FA5}">
+                      <a16:colId xmlns:a16="http://schemas.microsoft.com/office/drawing/2014/main" val="20000"/>
+                    </a:ext>
+                  </a:extLst>
+                </a:gridCol>
               </a:tblGrid>
               <a:tr h="489397">
                 <a:tc>
@@ -15867,7 +15992,7 @@
                     <a:p>
                       <a:pPr algn="ctr"/>
                       <a:r>
-                        <a:rPr lang="es-MX" dirty="0" smtClean="0"/>
+                        <a:rPr lang="es-MX" dirty="0"/>
                         <a:t>5</a:t>
                       </a:r>
                       <a:endParaRPr lang="es-ES" dirty="0"/>
@@ -15875,6 +16000,11 @@
                   </a:txBody>
                   <a:tcPr anchor="ctr"/>
                 </a:tc>
+                <a:extLst>
+                  <a:ext uri="{0D108BD9-81ED-4DB2-BD59-A6C34878D82A}">
+                    <a16:rowId xmlns:a16="http://schemas.microsoft.com/office/drawing/2014/main" val="10000"/>
+                  </a:ext>
+                </a:extLst>
               </a:tr>
             </a:tbl>
           </a:graphicData>
@@ -15905,7 +16035,13 @@
                 <a:tableStyleId>{BC89EF96-8CEA-46FF-86C4-4CE0E7609802}</a:tableStyleId>
               </a:tblPr>
               <a:tblGrid>
-                <a:gridCol w="476709"/>
+                <a:gridCol w="476709">
+                  <a:extLst>
+                    <a:ext uri="{9D8B030D-6E8A-4147-A177-3AD203B41FA5}">
+                      <a16:colId xmlns:a16="http://schemas.microsoft.com/office/drawing/2014/main" val="20000"/>
+                    </a:ext>
+                  </a:extLst>
+                </a:gridCol>
               </a:tblGrid>
               <a:tr h="489397">
                 <a:tc>
@@ -15915,7 +16051,7 @@
                     <a:p>
                       <a:pPr algn="ctr"/>
                       <a:r>
-                        <a:rPr lang="es-MX" dirty="0" smtClean="0"/>
+                        <a:rPr lang="es-MX" dirty="0"/>
                         <a:t>7</a:t>
                       </a:r>
                       <a:endParaRPr lang="es-ES" dirty="0"/>
@@ -15923,6 +16059,11 @@
                   </a:txBody>
                   <a:tcPr anchor="ctr"/>
                 </a:tc>
+                <a:extLst>
+                  <a:ext uri="{0D108BD9-81ED-4DB2-BD59-A6C34878D82A}">
+                    <a16:rowId xmlns:a16="http://schemas.microsoft.com/office/drawing/2014/main" val="10000"/>
+                  </a:ext>
+                </a:extLst>
               </a:tr>
             </a:tbl>
           </a:graphicData>
@@ -16175,7 +16316,13 @@
                 <a:tableStyleId>{BC89EF96-8CEA-46FF-86C4-4CE0E7609802}</a:tableStyleId>
               </a:tblPr>
               <a:tblGrid>
-                <a:gridCol w="476709"/>
+                <a:gridCol w="476709">
+                  <a:extLst>
+                    <a:ext uri="{9D8B030D-6E8A-4147-A177-3AD203B41FA5}">
+                      <a16:colId xmlns:a16="http://schemas.microsoft.com/office/drawing/2014/main" val="20000"/>
+                    </a:ext>
+                  </a:extLst>
+                </a:gridCol>
               </a:tblGrid>
               <a:tr h="489397">
                 <a:tc>
@@ -16185,7 +16332,7 @@
                     <a:p>
                       <a:pPr algn="ctr"/>
                       <a:r>
-                        <a:rPr lang="es-MX" dirty="0" smtClean="0"/>
+                        <a:rPr lang="es-MX" dirty="0"/>
                         <a:t>5</a:t>
                       </a:r>
                       <a:endParaRPr lang="es-ES" dirty="0"/>
@@ -16193,6 +16340,11 @@
                   </a:txBody>
                   <a:tcPr anchor="ctr"/>
                 </a:tc>
+                <a:extLst>
+                  <a:ext uri="{0D108BD9-81ED-4DB2-BD59-A6C34878D82A}">
+                    <a16:rowId xmlns:a16="http://schemas.microsoft.com/office/drawing/2014/main" val="10000"/>
+                  </a:ext>
+                </a:extLst>
               </a:tr>
             </a:tbl>
           </a:graphicData>
@@ -16223,7 +16375,13 @@
                 <a:tableStyleId>{BC89EF96-8CEA-46FF-86C4-4CE0E7609802}</a:tableStyleId>
               </a:tblPr>
               <a:tblGrid>
-                <a:gridCol w="476709"/>
+                <a:gridCol w="476709">
+                  <a:extLst>
+                    <a:ext uri="{9D8B030D-6E8A-4147-A177-3AD203B41FA5}">
+                      <a16:colId xmlns:a16="http://schemas.microsoft.com/office/drawing/2014/main" val="20000"/>
+                    </a:ext>
+                  </a:extLst>
+                </a:gridCol>
               </a:tblGrid>
               <a:tr h="489397">
                 <a:tc>
@@ -16233,7 +16391,7 @@
                     <a:p>
                       <a:pPr algn="ctr"/>
                       <a:r>
-                        <a:rPr lang="es-MX" dirty="0" smtClean="0"/>
+                        <a:rPr lang="es-MX" dirty="0"/>
                         <a:t>2</a:t>
                       </a:r>
                       <a:endParaRPr lang="es-ES" dirty="0"/>
@@ -16241,6 +16399,11 @@
                   </a:txBody>
                   <a:tcPr anchor="ctr"/>
                 </a:tc>
+                <a:extLst>
+                  <a:ext uri="{0D108BD9-81ED-4DB2-BD59-A6C34878D82A}">
+                    <a16:rowId xmlns:a16="http://schemas.microsoft.com/office/drawing/2014/main" val="10000"/>
+                  </a:ext>
+                </a:extLst>
               </a:tr>
             </a:tbl>
           </a:graphicData>
@@ -16311,7 +16474,13 @@
                 <a:tableStyleId>{BC89EF96-8CEA-46FF-86C4-4CE0E7609802}</a:tableStyleId>
               </a:tblPr>
               <a:tblGrid>
-                <a:gridCol w="476709"/>
+                <a:gridCol w="476709">
+                  <a:extLst>
+                    <a:ext uri="{9D8B030D-6E8A-4147-A177-3AD203B41FA5}">
+                      <a16:colId xmlns:a16="http://schemas.microsoft.com/office/drawing/2014/main" val="20000"/>
+                    </a:ext>
+                  </a:extLst>
+                </a:gridCol>
               </a:tblGrid>
               <a:tr h="489397">
                 <a:tc>
@@ -16321,7 +16490,7 @@
                     <a:p>
                       <a:pPr algn="ctr"/>
                       <a:r>
-                        <a:rPr lang="es-MX" dirty="0" smtClean="0"/>
+                        <a:rPr lang="es-MX" dirty="0"/>
                         <a:t>6</a:t>
                       </a:r>
                       <a:endParaRPr lang="es-ES" dirty="0"/>
@@ -16329,6 +16498,11 @@
                   </a:txBody>
                   <a:tcPr anchor="ctr"/>
                 </a:tc>
+                <a:extLst>
+                  <a:ext uri="{0D108BD9-81ED-4DB2-BD59-A6C34878D82A}">
+                    <a16:rowId xmlns:a16="http://schemas.microsoft.com/office/drawing/2014/main" val="10000"/>
+                  </a:ext>
+                </a:extLst>
               </a:tr>
             </a:tbl>
           </a:graphicData>
@@ -16359,7 +16533,13 @@
                 <a:tableStyleId>{BC89EF96-8CEA-46FF-86C4-4CE0E7609802}</a:tableStyleId>
               </a:tblPr>
               <a:tblGrid>
-                <a:gridCol w="476709"/>
+                <a:gridCol w="476709">
+                  <a:extLst>
+                    <a:ext uri="{9D8B030D-6E8A-4147-A177-3AD203B41FA5}">
+                      <a16:colId xmlns:a16="http://schemas.microsoft.com/office/drawing/2014/main" val="20000"/>
+                    </a:ext>
+                  </a:extLst>
+                </a:gridCol>
               </a:tblGrid>
               <a:tr h="489397">
                 <a:tc>
@@ -16369,7 +16549,7 @@
                     <a:p>
                       <a:pPr algn="ctr"/>
                       <a:r>
-                        <a:rPr lang="es-MX" dirty="0" smtClean="0"/>
+                        <a:rPr lang="es-MX" dirty="0"/>
                         <a:t>1</a:t>
                       </a:r>
                       <a:endParaRPr lang="es-ES" dirty="0"/>
@@ -16377,6 +16557,11 @@
                   </a:txBody>
                   <a:tcPr anchor="ctr"/>
                 </a:tc>
+                <a:extLst>
+                  <a:ext uri="{0D108BD9-81ED-4DB2-BD59-A6C34878D82A}">
+                    <a16:rowId xmlns:a16="http://schemas.microsoft.com/office/drawing/2014/main" val="10000"/>
+                  </a:ext>
+                </a:extLst>
               </a:tr>
             </a:tbl>
           </a:graphicData>
@@ -16487,7 +16672,13 @@
                 <a:tableStyleId>{BC89EF96-8CEA-46FF-86C4-4CE0E7609802}</a:tableStyleId>
               </a:tblPr>
               <a:tblGrid>
-                <a:gridCol w="4672476"/>
+                <a:gridCol w="4672476">
+                  <a:extLst>
+                    <a:ext uri="{9D8B030D-6E8A-4147-A177-3AD203B41FA5}">
+                      <a16:colId xmlns:a16="http://schemas.microsoft.com/office/drawing/2014/main" val="20000"/>
+                    </a:ext>
+                  </a:extLst>
+                </a:gridCol>
               </a:tblGrid>
               <a:tr h="489397">
                 <a:tc>
@@ -16497,7 +16688,7 @@
                     <a:p>
                       <a:pPr algn="ctr"/>
                       <a:r>
-                        <a:rPr lang="es-MX" dirty="0" smtClean="0"/>
+                        <a:rPr lang="es-MX" dirty="0"/>
                         <a:t>(-1)^(1+i)</a:t>
                       </a:r>
                       <a:endParaRPr lang="es-ES" dirty="0"/>
@@ -16505,6 +16696,11 @@
                   </a:txBody>
                   <a:tcPr anchor="ctr"/>
                 </a:tc>
+                <a:extLst>
+                  <a:ext uri="{0D108BD9-81ED-4DB2-BD59-A6C34878D82A}">
+                    <a16:rowId xmlns:a16="http://schemas.microsoft.com/office/drawing/2014/main" val="10000"/>
+                  </a:ext>
+                </a:extLst>
               </a:tr>
             </a:tbl>
           </a:graphicData>
@@ -16520,13 +16716,6 @@
   <p:clrMapOvr>
     <a:masterClrMapping/>
   </p:clrMapOvr>
-  <p:timing>
-    <p:tnLst>
-      <p:par>
-        <p:cTn id="1" dur="indefinite" restart="never" nodeType="tmRoot"/>
-      </p:par>
-    </p:tnLst>
-  </p:timing>
 </p:sld>
 </file>
 
@@ -16563,7 +16752,7 @@
           <a:lstStyle/>
           <a:p>
             <a:r>
-              <a:rPr lang="es-MX" dirty="0" smtClean="0"/>
+              <a:rPr lang="es-MX" dirty="0"/>
               <a:t>Determinante</a:t>
             </a:r>
             <a:endParaRPr lang="es-ES" dirty="0"/>
@@ -16596,10 +16785,34 @@
                 <a:tableStyleId>{3B4B98B0-60AC-42C2-AFA5-B58CD77FA1E5}</a:tableStyleId>
               </a:tblPr>
               <a:tblGrid>
-                <a:gridCol w="615815"/>
-                <a:gridCol w="615815"/>
-                <a:gridCol w="615815"/>
-                <a:gridCol w="615815"/>
+                <a:gridCol w="615815">
+                  <a:extLst>
+                    <a:ext uri="{9D8B030D-6E8A-4147-A177-3AD203B41FA5}">
+                      <a16:colId xmlns:a16="http://schemas.microsoft.com/office/drawing/2014/main" val="20000"/>
+                    </a:ext>
+                  </a:extLst>
+                </a:gridCol>
+                <a:gridCol w="615815">
+                  <a:extLst>
+                    <a:ext uri="{9D8B030D-6E8A-4147-A177-3AD203B41FA5}">
+                      <a16:colId xmlns:a16="http://schemas.microsoft.com/office/drawing/2014/main" val="20001"/>
+                    </a:ext>
+                  </a:extLst>
+                </a:gridCol>
+                <a:gridCol w="615815">
+                  <a:extLst>
+                    <a:ext uri="{9D8B030D-6E8A-4147-A177-3AD203B41FA5}">
+                      <a16:colId xmlns:a16="http://schemas.microsoft.com/office/drawing/2014/main" val="20002"/>
+                    </a:ext>
+                  </a:extLst>
+                </a:gridCol>
+                <a:gridCol w="615815">
+                  <a:extLst>
+                    <a:ext uri="{9D8B030D-6E8A-4147-A177-3AD203B41FA5}">
+                      <a16:colId xmlns:a16="http://schemas.microsoft.com/office/drawing/2014/main" val="20003"/>
+                    </a:ext>
+                  </a:extLst>
+                </a:gridCol>
               </a:tblGrid>
               <a:tr h="411634">
                 <a:tc>
@@ -16663,7 +16876,7 @@
                     <a:p>
                       <a:pPr algn="ctr"/>
                       <a:r>
-                        <a:rPr lang="es-MX" b="1" dirty="0" smtClean="0"/>
+                        <a:rPr lang="es-MX" b="1" dirty="0"/>
                         <a:t>1</a:t>
                       </a:r>
                       <a:endParaRPr lang="es-ES" b="1" dirty="0"/>
@@ -16721,7 +16934,7 @@
                     <a:p>
                       <a:pPr algn="ctr"/>
                       <a:r>
-                        <a:rPr lang="es-MX" b="1" dirty="0" smtClean="0"/>
+                        <a:rPr lang="es-MX" b="1" dirty="0"/>
                         <a:t>2</a:t>
                       </a:r>
                       <a:endParaRPr lang="es-ES" b="1" dirty="0"/>
@@ -16779,7 +16992,7 @@
                     <a:p>
                       <a:pPr algn="ctr"/>
                       <a:r>
-                        <a:rPr lang="es-MX" b="1" dirty="0" smtClean="0"/>
+                        <a:rPr lang="es-MX" b="1" dirty="0"/>
                         <a:t>3</a:t>
                       </a:r>
                       <a:endParaRPr lang="es-ES" b="1" dirty="0"/>
@@ -16830,6 +17043,11 @@
                     </a:solidFill>
                   </a:tcPr>
                 </a:tc>
+                <a:extLst>
+                  <a:ext uri="{0D108BD9-81ED-4DB2-BD59-A6C34878D82A}">
+                    <a16:rowId xmlns:a16="http://schemas.microsoft.com/office/drawing/2014/main" val="10000"/>
+                  </a:ext>
+                </a:extLst>
               </a:tr>
               <a:tr h="411634">
                 <a:tc>
@@ -16839,7 +17057,7 @@
                     <a:p>
                       <a:pPr algn="ctr"/>
                       <a:r>
-                        <a:rPr lang="es-MX" b="1" dirty="0" smtClean="0"/>
+                        <a:rPr lang="es-MX" b="1" dirty="0"/>
                         <a:t>1</a:t>
                       </a:r>
                       <a:endParaRPr lang="es-ES" b="1" dirty="0"/>
@@ -16897,11 +17115,11 @@
                     <a:p>
                       <a:pPr algn="ctr"/>
                       <a:r>
-                        <a:rPr lang="es-MX" b="1" dirty="0" smtClean="0"/>
+                        <a:rPr lang="es-MX" b="1" dirty="0"/>
                         <a:t>a</a:t>
                       </a:r>
                       <a:r>
-                        <a:rPr lang="es-MX" sz="1050" b="1" dirty="0" smtClean="0"/>
+                        <a:rPr lang="es-MX" sz="1050" b="1" dirty="0"/>
                         <a:t>11</a:t>
                       </a:r>
                       <a:endParaRPr lang="es-ES" b="1" dirty="0"/>
@@ -16969,14 +17187,14 @@
                         <a:defRPr/>
                       </a:pPr>
                       <a:r>
-                        <a:rPr lang="es-MX" b="1" dirty="0" smtClean="0"/>
+                        <a:rPr lang="es-MX" b="1" dirty="0"/>
                         <a:t>a</a:t>
                       </a:r>
                       <a:r>
-                        <a:rPr lang="es-MX" sz="1200" b="1" dirty="0" smtClean="0"/>
+                        <a:rPr lang="es-MX" sz="1200" b="1" dirty="0"/>
                         <a:t>12</a:t>
                       </a:r>
-                      <a:endParaRPr lang="es-ES" b="1" dirty="0" smtClean="0"/>
+                      <a:endParaRPr lang="es-ES" b="1" dirty="0"/>
                     </a:p>
                   </a:txBody>
                   <a:tcPr anchor="ctr">
@@ -17041,7 +17259,7 @@
                         <a:defRPr/>
                       </a:pPr>
                       <a:r>
-                        <a:rPr kumimoji="0" lang="es-MX" sz="1800" b="1" i="0" u="none" strike="noStrike" kern="1200" cap="none" spc="0" normalizeH="0" baseline="0" noProof="0" dirty="0" smtClean="0">
+                        <a:rPr kumimoji="0" lang="es-MX" sz="1800" b="1" i="0" u="none" strike="noStrike" kern="1200" cap="none" spc="0" normalizeH="0" baseline="0" noProof="0" dirty="0">
                           <a:ln>
                             <a:noFill/>
                           </a:ln>
@@ -17058,7 +17276,7 @@
                         <a:t>a</a:t>
                       </a:r>
                       <a:r>
-                        <a:rPr kumimoji="0" lang="es-MX" sz="1200" b="1" i="0" u="none" strike="noStrike" kern="1200" cap="none" spc="0" normalizeH="0" baseline="0" noProof="0" dirty="0" smtClean="0">
+                        <a:rPr kumimoji="0" lang="es-MX" sz="1200" b="1" i="0" u="none" strike="noStrike" kern="1200" cap="none" spc="0" normalizeH="0" baseline="0" noProof="0" dirty="0">
                           <a:ln>
                             <a:noFill/>
                           </a:ln>
@@ -17074,7 +17292,7 @@
                         </a:rPr>
                         <a:t>13</a:t>
                       </a:r>
-                      <a:endParaRPr kumimoji="0" lang="es-ES" sz="1800" b="1" i="0" u="none" strike="noStrike" kern="1200" cap="none" spc="0" normalizeH="0" baseline="0" noProof="0" dirty="0" smtClean="0">
+                      <a:endParaRPr kumimoji="0" lang="es-ES" sz="1800" b="1" i="0" u="none" strike="noStrike" kern="1200" cap="none" spc="0" normalizeH="0" baseline="0" noProof="0" dirty="0">
                         <a:ln>
                           <a:noFill/>
                         </a:ln>
@@ -17129,6 +17347,11 @@
                     </a:lnB>
                   </a:tcPr>
                 </a:tc>
+                <a:extLst>
+                  <a:ext uri="{0D108BD9-81ED-4DB2-BD59-A6C34878D82A}">
+                    <a16:rowId xmlns:a16="http://schemas.microsoft.com/office/drawing/2014/main" val="10001"/>
+                  </a:ext>
+                </a:extLst>
               </a:tr>
               <a:tr h="411634">
                 <a:tc>
@@ -17138,7 +17361,7 @@
                     <a:p>
                       <a:pPr algn="ctr"/>
                       <a:r>
-                        <a:rPr lang="es-MX" b="1" dirty="0" smtClean="0"/>
+                        <a:rPr lang="es-MX" b="1" dirty="0"/>
                         <a:t>2</a:t>
                       </a:r>
                       <a:endParaRPr lang="es-ES" b="1" dirty="0"/>
@@ -17212,7 +17435,7 @@
                         <a:defRPr/>
                       </a:pPr>
                       <a:r>
-                        <a:rPr kumimoji="0" lang="es-MX" sz="1800" b="1" i="0" u="none" strike="noStrike" kern="1200" cap="none" spc="0" normalizeH="0" baseline="0" noProof="0" dirty="0" smtClean="0">
+                        <a:rPr kumimoji="0" lang="es-MX" sz="1800" b="1" i="0" u="none" strike="noStrike" kern="1200" cap="none" spc="0" normalizeH="0" baseline="0" noProof="0" dirty="0">
                           <a:ln>
                             <a:noFill/>
                           </a:ln>
@@ -17229,7 +17452,7 @@
                         <a:t>a</a:t>
                       </a:r>
                       <a:r>
-                        <a:rPr kumimoji="0" lang="es-MX" sz="1200" b="1" i="0" u="none" strike="noStrike" kern="1200" cap="none" spc="0" normalizeH="0" baseline="0" noProof="0" dirty="0" smtClean="0">
+                        <a:rPr kumimoji="0" lang="es-MX" sz="1200" b="1" i="0" u="none" strike="noStrike" kern="1200" cap="none" spc="0" normalizeH="0" baseline="0" noProof="0" dirty="0">
                           <a:ln>
                             <a:noFill/>
                           </a:ln>
@@ -17245,7 +17468,7 @@
                         </a:rPr>
                         <a:t>21</a:t>
                       </a:r>
-                      <a:endParaRPr kumimoji="0" lang="es-ES" sz="1800" b="1" i="0" u="none" strike="noStrike" kern="1200" cap="none" spc="0" normalizeH="0" baseline="0" noProof="0" dirty="0" smtClean="0">
+                      <a:endParaRPr kumimoji="0" lang="es-ES" sz="1800" b="1" i="0" u="none" strike="noStrike" kern="1200" cap="none" spc="0" normalizeH="0" baseline="0" noProof="0" dirty="0">
                         <a:ln>
                           <a:noFill/>
                         </a:ln>
@@ -17323,7 +17546,7 @@
                         <a:defRPr/>
                       </a:pPr>
                       <a:r>
-                        <a:rPr kumimoji="0" lang="es-MX" sz="1800" b="1" i="0" u="none" strike="noStrike" kern="1200" cap="none" spc="0" normalizeH="0" baseline="0" noProof="0" dirty="0" smtClean="0">
+                        <a:rPr kumimoji="0" lang="es-MX" sz="1800" b="1" i="0" u="none" strike="noStrike" kern="1200" cap="none" spc="0" normalizeH="0" baseline="0" noProof="0" dirty="0">
                           <a:ln>
                             <a:noFill/>
                           </a:ln>
@@ -17340,7 +17563,7 @@
                         <a:t>a</a:t>
                       </a:r>
                       <a:r>
-                        <a:rPr kumimoji="0" lang="es-MX" sz="1200" b="1" i="0" u="none" strike="noStrike" kern="1200" cap="none" spc="0" normalizeH="0" baseline="0" noProof="0" dirty="0" smtClean="0">
+                        <a:rPr kumimoji="0" lang="es-MX" sz="1200" b="1" i="0" u="none" strike="noStrike" kern="1200" cap="none" spc="0" normalizeH="0" baseline="0" noProof="0" dirty="0">
                           <a:ln>
                             <a:noFill/>
                           </a:ln>
@@ -17356,7 +17579,7 @@
                         </a:rPr>
                         <a:t>22</a:t>
                       </a:r>
-                      <a:endParaRPr kumimoji="0" lang="es-ES" sz="1800" b="1" i="0" u="none" strike="noStrike" kern="1200" cap="none" spc="0" normalizeH="0" baseline="0" noProof="0" dirty="0" smtClean="0">
+                      <a:endParaRPr kumimoji="0" lang="es-ES" sz="1800" b="1" i="0" u="none" strike="noStrike" kern="1200" cap="none" spc="0" normalizeH="0" baseline="0" noProof="0" dirty="0">
                         <a:ln>
                           <a:noFill/>
                         </a:ln>
@@ -17434,7 +17657,7 @@
                         <a:defRPr/>
                       </a:pPr>
                       <a:r>
-                        <a:rPr kumimoji="0" lang="es-MX" sz="1800" b="1" i="0" u="none" strike="noStrike" kern="1200" cap="none" spc="0" normalizeH="0" baseline="0" noProof="0" dirty="0" smtClean="0">
+                        <a:rPr kumimoji="0" lang="es-MX" sz="1800" b="1" i="0" u="none" strike="noStrike" kern="1200" cap="none" spc="0" normalizeH="0" baseline="0" noProof="0" dirty="0">
                           <a:ln>
                             <a:noFill/>
                           </a:ln>
@@ -17451,7 +17674,7 @@
                         <a:t>a</a:t>
                       </a:r>
                       <a:r>
-                        <a:rPr kumimoji="0" lang="es-MX" sz="1200" b="1" i="0" u="none" strike="noStrike" kern="1200" cap="none" spc="0" normalizeH="0" baseline="0" noProof="0" dirty="0" smtClean="0">
+                        <a:rPr kumimoji="0" lang="es-MX" sz="1200" b="1" i="0" u="none" strike="noStrike" kern="1200" cap="none" spc="0" normalizeH="0" baseline="0" noProof="0" dirty="0">
                           <a:ln>
                             <a:noFill/>
                           </a:ln>
@@ -17467,7 +17690,7 @@
                         </a:rPr>
                         <a:t>23</a:t>
                       </a:r>
-                      <a:endParaRPr kumimoji="0" lang="es-ES" sz="1800" b="1" i="0" u="none" strike="noStrike" kern="1200" cap="none" spc="0" normalizeH="0" baseline="0" noProof="0" dirty="0" smtClean="0">
+                      <a:endParaRPr kumimoji="0" lang="es-ES" sz="1800" b="1" i="0" u="none" strike="noStrike" kern="1200" cap="none" spc="0" normalizeH="0" baseline="0" noProof="0" dirty="0">
                         <a:ln>
                           <a:noFill/>
                         </a:ln>
@@ -17522,6 +17745,11 @@
                     </a:lnB>
                   </a:tcPr>
                 </a:tc>
+                <a:extLst>
+                  <a:ext uri="{0D108BD9-81ED-4DB2-BD59-A6C34878D82A}">
+                    <a16:rowId xmlns:a16="http://schemas.microsoft.com/office/drawing/2014/main" val="10002"/>
+                  </a:ext>
+                </a:extLst>
               </a:tr>
               <a:tr h="411634">
                 <a:tc>
@@ -17531,7 +17759,7 @@
                     <a:p>
                       <a:pPr algn="ctr"/>
                       <a:r>
-                        <a:rPr lang="es-MX" b="1" dirty="0" smtClean="0"/>
+                        <a:rPr lang="es-MX" b="1" dirty="0"/>
                         <a:t>3</a:t>
                       </a:r>
                     </a:p>
@@ -17604,7 +17832,7 @@
                         <a:defRPr/>
                       </a:pPr>
                       <a:r>
-                        <a:rPr kumimoji="0" lang="es-MX" sz="1800" b="1" i="0" u="none" strike="noStrike" kern="1200" cap="none" spc="0" normalizeH="0" baseline="0" noProof="0" dirty="0" smtClean="0">
+                        <a:rPr kumimoji="0" lang="es-MX" sz="1800" b="1" i="0" u="none" strike="noStrike" kern="1200" cap="none" spc="0" normalizeH="0" baseline="0" noProof="0" dirty="0">
                           <a:ln>
                             <a:noFill/>
                           </a:ln>
@@ -17621,7 +17849,7 @@
                         <a:t>a</a:t>
                       </a:r>
                       <a:r>
-                        <a:rPr kumimoji="0" lang="es-MX" sz="1200" b="1" i="0" u="none" strike="noStrike" kern="1200" cap="none" spc="0" normalizeH="0" baseline="0" noProof="0" dirty="0" smtClean="0">
+                        <a:rPr kumimoji="0" lang="es-MX" sz="1200" b="1" i="0" u="none" strike="noStrike" kern="1200" cap="none" spc="0" normalizeH="0" baseline="0" noProof="0" dirty="0">
                           <a:ln>
                             <a:noFill/>
                           </a:ln>
@@ -17637,7 +17865,7 @@
                         </a:rPr>
                         <a:t>31</a:t>
                       </a:r>
-                      <a:endParaRPr kumimoji="0" lang="es-ES" sz="1800" b="1" i="0" u="none" strike="noStrike" kern="1200" cap="none" spc="0" normalizeH="0" baseline="0" noProof="0" dirty="0" smtClean="0">
+                      <a:endParaRPr kumimoji="0" lang="es-ES" sz="1800" b="1" i="0" u="none" strike="noStrike" kern="1200" cap="none" spc="0" normalizeH="0" baseline="0" noProof="0" dirty="0">
                         <a:ln>
                           <a:noFill/>
                         </a:ln>
@@ -17715,7 +17943,7 @@
                         <a:defRPr/>
                       </a:pPr>
                       <a:r>
-                        <a:rPr kumimoji="0" lang="es-MX" sz="1800" b="1" i="0" u="none" strike="noStrike" kern="1200" cap="none" spc="0" normalizeH="0" baseline="0" noProof="0" dirty="0" smtClean="0">
+                        <a:rPr kumimoji="0" lang="es-MX" sz="1800" b="1" i="0" u="none" strike="noStrike" kern="1200" cap="none" spc="0" normalizeH="0" baseline="0" noProof="0" dirty="0">
                           <a:ln>
                             <a:noFill/>
                           </a:ln>
@@ -17732,7 +17960,7 @@
                         <a:t>a</a:t>
                       </a:r>
                       <a:r>
-                        <a:rPr kumimoji="0" lang="es-MX" sz="1200" b="1" i="0" u="none" strike="noStrike" kern="1200" cap="none" spc="0" normalizeH="0" baseline="0" noProof="0" dirty="0" smtClean="0">
+                        <a:rPr kumimoji="0" lang="es-MX" sz="1200" b="1" i="0" u="none" strike="noStrike" kern="1200" cap="none" spc="0" normalizeH="0" baseline="0" noProof="0" dirty="0">
                           <a:ln>
                             <a:noFill/>
                           </a:ln>
@@ -17748,7 +17976,7 @@
                         </a:rPr>
                         <a:t>32</a:t>
                       </a:r>
-                      <a:endParaRPr kumimoji="0" lang="es-ES" sz="1800" b="1" i="0" u="none" strike="noStrike" kern="1200" cap="none" spc="0" normalizeH="0" baseline="0" noProof="0" dirty="0" smtClean="0">
+                      <a:endParaRPr kumimoji="0" lang="es-ES" sz="1800" b="1" i="0" u="none" strike="noStrike" kern="1200" cap="none" spc="0" normalizeH="0" baseline="0" noProof="0" dirty="0">
                         <a:ln>
                           <a:noFill/>
                         </a:ln>
@@ -17826,7 +18054,7 @@
                         <a:defRPr/>
                       </a:pPr>
                       <a:r>
-                        <a:rPr kumimoji="0" lang="es-MX" sz="1800" b="1" i="0" u="none" strike="noStrike" kern="1200" cap="none" spc="0" normalizeH="0" baseline="0" noProof="0" dirty="0" smtClean="0">
+                        <a:rPr kumimoji="0" lang="es-MX" sz="1800" b="1" i="0" u="none" strike="noStrike" kern="1200" cap="none" spc="0" normalizeH="0" baseline="0" noProof="0" dirty="0">
                           <a:ln>
                             <a:noFill/>
                           </a:ln>
@@ -17843,7 +18071,7 @@
                         <a:t>a</a:t>
                       </a:r>
                       <a:r>
-                        <a:rPr kumimoji="0" lang="es-MX" sz="1200" b="1" i="0" u="none" strike="noStrike" kern="1200" cap="none" spc="0" normalizeH="0" baseline="0" noProof="0" dirty="0" smtClean="0">
+                        <a:rPr kumimoji="0" lang="es-MX" sz="1200" b="1" i="0" u="none" strike="noStrike" kern="1200" cap="none" spc="0" normalizeH="0" baseline="0" noProof="0" dirty="0">
                           <a:ln>
                             <a:noFill/>
                           </a:ln>
@@ -17859,7 +18087,7 @@
                         </a:rPr>
                         <a:t>33</a:t>
                       </a:r>
-                      <a:endParaRPr kumimoji="0" lang="es-ES" sz="1800" b="1" i="0" u="none" strike="noStrike" kern="1200" cap="none" spc="0" normalizeH="0" baseline="0" noProof="0" dirty="0" smtClean="0">
+                      <a:endParaRPr kumimoji="0" lang="es-ES" sz="1800" b="1" i="0" u="none" strike="noStrike" kern="1200" cap="none" spc="0" normalizeH="0" baseline="0" noProof="0" dirty="0">
                         <a:ln>
                           <a:noFill/>
                         </a:ln>
@@ -17914,6 +18142,11 @@
                     </a:lnB>
                   </a:tcPr>
                 </a:tc>
+                <a:extLst>
+                  <a:ext uri="{0D108BD9-81ED-4DB2-BD59-A6C34878D82A}">
+                    <a16:rowId xmlns:a16="http://schemas.microsoft.com/office/drawing/2014/main" val="10003"/>
+                  </a:ext>
+                </a:extLst>
               </a:tr>
             </a:tbl>
           </a:graphicData>
@@ -18151,7 +18384,13 @@
                 <a:tableStyleId>{BC89EF96-8CEA-46FF-86C4-4CE0E7609802}</a:tableStyleId>
               </a:tblPr>
               <a:tblGrid>
-                <a:gridCol w="604257"/>
+                <a:gridCol w="604257">
+                  <a:extLst>
+                    <a:ext uri="{9D8B030D-6E8A-4147-A177-3AD203B41FA5}">
+                      <a16:colId xmlns:a16="http://schemas.microsoft.com/office/drawing/2014/main" val="20000"/>
+                    </a:ext>
+                  </a:extLst>
+                </a:gridCol>
               </a:tblGrid>
               <a:tr h="489397">
                 <a:tc>
@@ -18161,7 +18400,7 @@
                     <a:p>
                       <a:pPr algn="ctr"/>
                       <a:r>
-                        <a:rPr kumimoji="0" lang="es-MX" sz="1800" b="1" i="0" u="none" strike="noStrike" kern="1200" cap="none" spc="0" normalizeH="0" baseline="0" noProof="0" dirty="0" smtClean="0">
+                        <a:rPr kumimoji="0" lang="es-MX" sz="1800" b="1" i="0" u="none" strike="noStrike" kern="1200" cap="none" spc="0" normalizeH="0" baseline="0" noProof="0" dirty="0">
                           <a:ln>
                             <a:noFill/>
                           </a:ln>
@@ -18178,7 +18417,7 @@
                         <a:t>a</a:t>
                       </a:r>
                       <a:r>
-                        <a:rPr kumimoji="0" lang="es-MX" sz="1050" b="1" i="0" u="none" strike="noStrike" kern="1200" cap="none" spc="0" normalizeH="0" baseline="0" noProof="0" dirty="0" smtClean="0">
+                        <a:rPr kumimoji="0" lang="es-MX" sz="1050" b="1" i="0" u="none" strike="noStrike" kern="1200" cap="none" spc="0" normalizeH="0" baseline="0" noProof="0" dirty="0">
                           <a:ln>
                             <a:noFill/>
                           </a:ln>
@@ -18199,6 +18438,11 @@
                   </a:txBody>
                   <a:tcPr anchor="ctr"/>
                 </a:tc>
+                <a:extLst>
+                  <a:ext uri="{0D108BD9-81ED-4DB2-BD59-A6C34878D82A}">
+                    <a16:rowId xmlns:a16="http://schemas.microsoft.com/office/drawing/2014/main" val="10000"/>
+                  </a:ext>
+                </a:extLst>
               </a:tr>
             </a:tbl>
           </a:graphicData>
@@ -18264,8 +18508,20 @@
                 <a:tableStyleId>{3B4B98B0-60AC-42C2-AFA5-B58CD77FA1E5}</a:tableStyleId>
               </a:tblPr>
               <a:tblGrid>
-                <a:gridCol w="615815"/>
-                <a:gridCol w="615815"/>
+                <a:gridCol w="615815">
+                  <a:extLst>
+                    <a:ext uri="{9D8B030D-6E8A-4147-A177-3AD203B41FA5}">
+                      <a16:colId xmlns:a16="http://schemas.microsoft.com/office/drawing/2014/main" val="20000"/>
+                    </a:ext>
+                  </a:extLst>
+                </a:gridCol>
+                <a:gridCol w="615815">
+                  <a:extLst>
+                    <a:ext uri="{9D8B030D-6E8A-4147-A177-3AD203B41FA5}">
+                      <a16:colId xmlns:a16="http://schemas.microsoft.com/office/drawing/2014/main" val="20001"/>
+                    </a:ext>
+                  </a:extLst>
+                </a:gridCol>
               </a:tblGrid>
               <a:tr h="411634">
                 <a:tc>
@@ -18275,7 +18531,7 @@
                     <a:p>
                       <a:pPr algn="ctr"/>
                       <a:r>
-                        <a:rPr kumimoji="0" lang="es-MX" sz="1800" b="1" i="0" u="none" strike="noStrike" kern="1200" cap="none" spc="0" normalizeH="0" baseline="0" noProof="0" dirty="0" smtClean="0">
+                        <a:rPr kumimoji="0" lang="es-MX" sz="1800" b="1" i="0" u="none" strike="noStrike" kern="1200" cap="none" spc="0" normalizeH="0" baseline="0" noProof="0" dirty="0">
                           <a:ln>
                             <a:noFill/>
                           </a:ln>
@@ -18292,7 +18548,7 @@
                         <a:t>a</a:t>
                       </a:r>
                       <a:r>
-                        <a:rPr kumimoji="0" lang="es-MX" sz="1050" b="1" i="0" u="none" strike="noStrike" kern="1200" cap="none" spc="0" normalizeH="0" baseline="0" noProof="0" dirty="0" smtClean="0">
+                        <a:rPr kumimoji="0" lang="es-MX" sz="1050" b="1" i="0" u="none" strike="noStrike" kern="1200" cap="none" spc="0" normalizeH="0" baseline="0" noProof="0" dirty="0">
                           <a:ln>
                             <a:noFill/>
                           </a:ln>
@@ -18357,7 +18613,7 @@
                     <a:p>
                       <a:pPr algn="ctr"/>
                       <a:r>
-                        <a:rPr kumimoji="0" lang="es-MX" sz="1800" b="1" i="0" u="none" strike="noStrike" kern="1200" cap="none" spc="0" normalizeH="0" baseline="0" noProof="0" dirty="0" smtClean="0">
+                        <a:rPr kumimoji="0" lang="es-MX" sz="1800" b="1" i="0" u="none" strike="noStrike" kern="1200" cap="none" spc="0" normalizeH="0" baseline="0" noProof="0" dirty="0">
                           <a:ln>
                             <a:noFill/>
                           </a:ln>
@@ -18374,7 +18630,7 @@
                         <a:t>a</a:t>
                       </a:r>
                       <a:r>
-                        <a:rPr kumimoji="0" lang="es-MX" sz="1050" b="1" i="0" u="none" strike="noStrike" kern="1200" cap="none" spc="0" normalizeH="0" baseline="0" noProof="0" dirty="0" smtClean="0">
+                        <a:rPr kumimoji="0" lang="es-MX" sz="1050" b="1" i="0" u="none" strike="noStrike" kern="1200" cap="none" spc="0" normalizeH="0" baseline="0" noProof="0" dirty="0">
                           <a:ln>
                             <a:noFill/>
                           </a:ln>
@@ -18432,6 +18688,11 @@
                     </a:lnB>
                   </a:tcPr>
                 </a:tc>
+                <a:extLst>
+                  <a:ext uri="{0D108BD9-81ED-4DB2-BD59-A6C34878D82A}">
+                    <a16:rowId xmlns:a16="http://schemas.microsoft.com/office/drawing/2014/main" val="10000"/>
+                  </a:ext>
+                </a:extLst>
               </a:tr>
               <a:tr h="411634">
                 <a:tc>
@@ -18441,7 +18702,7 @@
                     <a:p>
                       <a:pPr algn="ctr"/>
                       <a:r>
-                        <a:rPr kumimoji="0" lang="es-MX" sz="1800" b="1" i="0" u="none" strike="noStrike" kern="1200" cap="none" spc="0" normalizeH="0" baseline="0" noProof="0" dirty="0" smtClean="0">
+                        <a:rPr kumimoji="0" lang="es-MX" sz="1800" b="1" i="0" u="none" strike="noStrike" kern="1200" cap="none" spc="0" normalizeH="0" baseline="0" noProof="0" dirty="0">
                           <a:ln>
                             <a:noFill/>
                           </a:ln>
@@ -18458,7 +18719,7 @@
                         <a:t>a</a:t>
                       </a:r>
                       <a:r>
-                        <a:rPr kumimoji="0" lang="es-MX" sz="1050" b="1" i="0" u="none" strike="noStrike" kern="1200" cap="none" spc="0" normalizeH="0" baseline="0" noProof="0" dirty="0" smtClean="0">
+                        <a:rPr kumimoji="0" lang="es-MX" sz="1050" b="1" i="0" u="none" strike="noStrike" kern="1200" cap="none" spc="0" normalizeH="0" baseline="0" noProof="0" dirty="0">
                           <a:ln>
                             <a:noFill/>
                           </a:ln>
@@ -18523,7 +18784,7 @@
                     <a:p>
                       <a:pPr algn="ctr"/>
                       <a:r>
-                        <a:rPr kumimoji="0" lang="es-MX" sz="1800" b="1" i="0" u="none" strike="noStrike" kern="1200" cap="none" spc="0" normalizeH="0" baseline="0" noProof="0" dirty="0" smtClean="0">
+                        <a:rPr kumimoji="0" lang="es-MX" sz="1800" b="1" i="0" u="none" strike="noStrike" kern="1200" cap="none" spc="0" normalizeH="0" baseline="0" noProof="0" dirty="0">
                           <a:ln>
                             <a:noFill/>
                           </a:ln>
@@ -18540,7 +18801,7 @@
                         <a:t>a</a:t>
                       </a:r>
                       <a:r>
-                        <a:rPr kumimoji="0" lang="es-MX" sz="1050" b="1" i="0" u="none" strike="noStrike" kern="1200" cap="none" spc="0" normalizeH="0" baseline="0" noProof="0" dirty="0" smtClean="0">
+                        <a:rPr kumimoji="0" lang="es-MX" sz="1050" b="1" i="0" u="none" strike="noStrike" kern="1200" cap="none" spc="0" normalizeH="0" baseline="0" noProof="0" dirty="0">
                           <a:ln>
                             <a:noFill/>
                           </a:ln>
@@ -18598,6 +18859,11 @@
                     </a:lnB>
                   </a:tcPr>
                 </a:tc>
+                <a:extLst>
+                  <a:ext uri="{0D108BD9-81ED-4DB2-BD59-A6C34878D82A}">
+                    <a16:rowId xmlns:a16="http://schemas.microsoft.com/office/drawing/2014/main" val="10001"/>
+                  </a:ext>
+                </a:extLst>
               </a:tr>
             </a:tbl>
           </a:graphicData>
@@ -18628,8 +18894,20 @@
                 <a:tableStyleId>{3B4B98B0-60AC-42C2-AFA5-B58CD77FA1E5}</a:tableStyleId>
               </a:tblPr>
               <a:tblGrid>
-                <a:gridCol w="615815"/>
-                <a:gridCol w="615815"/>
+                <a:gridCol w="615815">
+                  <a:extLst>
+                    <a:ext uri="{9D8B030D-6E8A-4147-A177-3AD203B41FA5}">
+                      <a16:colId xmlns:a16="http://schemas.microsoft.com/office/drawing/2014/main" val="20000"/>
+                    </a:ext>
+                  </a:extLst>
+                </a:gridCol>
+                <a:gridCol w="615815">
+                  <a:extLst>
+                    <a:ext uri="{9D8B030D-6E8A-4147-A177-3AD203B41FA5}">
+                      <a16:colId xmlns:a16="http://schemas.microsoft.com/office/drawing/2014/main" val="20001"/>
+                    </a:ext>
+                  </a:extLst>
+                </a:gridCol>
               </a:tblGrid>
               <a:tr h="298760">
                 <a:tc>
@@ -18639,7 +18917,7 @@
                     <a:p>
                       <a:pPr algn="ctr"/>
                       <a:r>
-                        <a:rPr kumimoji="0" lang="es-MX" sz="1800" b="1" i="0" u="none" strike="noStrike" kern="1200" cap="none" spc="0" normalizeH="0" baseline="0" noProof="0" dirty="0" smtClean="0">
+                        <a:rPr kumimoji="0" lang="es-MX" sz="1800" b="1" i="0" u="none" strike="noStrike" kern="1200" cap="none" spc="0" normalizeH="0" baseline="0" noProof="0" dirty="0">
                           <a:ln>
                             <a:noFill/>
                           </a:ln>
@@ -18656,7 +18934,7 @@
                         <a:t>a</a:t>
                       </a:r>
                       <a:r>
-                        <a:rPr kumimoji="0" lang="es-MX" sz="1050" b="1" i="0" u="none" strike="noStrike" kern="1200" cap="none" spc="0" normalizeH="0" baseline="0" noProof="0" dirty="0" smtClean="0">
+                        <a:rPr kumimoji="0" lang="es-MX" sz="1050" b="1" i="0" u="none" strike="noStrike" kern="1200" cap="none" spc="0" normalizeH="0" baseline="0" noProof="0" dirty="0">
                           <a:ln>
                             <a:noFill/>
                           </a:ln>
@@ -18721,7 +18999,7 @@
                     <a:p>
                       <a:pPr algn="ctr"/>
                       <a:r>
-                        <a:rPr kumimoji="0" lang="es-MX" sz="1800" b="1" i="0" u="none" strike="noStrike" kern="1200" cap="none" spc="0" normalizeH="0" baseline="0" noProof="0" dirty="0" smtClean="0">
+                        <a:rPr kumimoji="0" lang="es-MX" sz="1800" b="1" i="0" u="none" strike="noStrike" kern="1200" cap="none" spc="0" normalizeH="0" baseline="0" noProof="0" dirty="0">
                           <a:ln>
                             <a:noFill/>
                           </a:ln>
@@ -18738,7 +19016,7 @@
                         <a:t>a</a:t>
                       </a:r>
                       <a:r>
-                        <a:rPr kumimoji="0" lang="es-MX" sz="1050" b="1" i="0" u="none" strike="noStrike" kern="1200" cap="none" spc="0" normalizeH="0" baseline="0" noProof="0" dirty="0" smtClean="0">
+                        <a:rPr kumimoji="0" lang="es-MX" sz="1050" b="1" i="0" u="none" strike="noStrike" kern="1200" cap="none" spc="0" normalizeH="0" baseline="0" noProof="0" dirty="0">
                           <a:ln>
                             <a:noFill/>
                           </a:ln>
@@ -18796,6 +19074,11 @@
                     </a:lnB>
                   </a:tcPr>
                 </a:tc>
+                <a:extLst>
+                  <a:ext uri="{0D108BD9-81ED-4DB2-BD59-A6C34878D82A}">
+                    <a16:rowId xmlns:a16="http://schemas.microsoft.com/office/drawing/2014/main" val="10000"/>
+                  </a:ext>
+                </a:extLst>
               </a:tr>
               <a:tr h="411634">
                 <a:tc>
@@ -18805,7 +19088,7 @@
                     <a:p>
                       <a:pPr algn="ctr"/>
                       <a:r>
-                        <a:rPr kumimoji="0" lang="es-MX" sz="1800" b="1" i="0" u="none" strike="noStrike" kern="1200" cap="none" spc="0" normalizeH="0" baseline="0" noProof="0" dirty="0" smtClean="0">
+                        <a:rPr kumimoji="0" lang="es-MX" sz="1800" b="1" i="0" u="none" strike="noStrike" kern="1200" cap="none" spc="0" normalizeH="0" baseline="0" noProof="0" dirty="0">
                           <a:ln>
                             <a:noFill/>
                           </a:ln>
@@ -18822,7 +19105,7 @@
                         <a:t>a</a:t>
                       </a:r>
                       <a:r>
-                        <a:rPr kumimoji="0" lang="es-MX" sz="1050" b="1" i="0" u="none" strike="noStrike" kern="1200" cap="none" spc="0" normalizeH="0" baseline="0" noProof="0" dirty="0" smtClean="0">
+                        <a:rPr kumimoji="0" lang="es-MX" sz="1050" b="1" i="0" u="none" strike="noStrike" kern="1200" cap="none" spc="0" normalizeH="0" baseline="0" noProof="0" dirty="0">
                           <a:ln>
                             <a:noFill/>
                           </a:ln>
@@ -18887,7 +19170,7 @@
                     <a:p>
                       <a:pPr algn="ctr"/>
                       <a:r>
-                        <a:rPr kumimoji="0" lang="es-MX" sz="1800" b="1" i="0" u="none" strike="noStrike" kern="1200" cap="none" spc="0" normalizeH="0" baseline="0" noProof="0" dirty="0" smtClean="0">
+                        <a:rPr kumimoji="0" lang="es-MX" sz="1800" b="1" i="0" u="none" strike="noStrike" kern="1200" cap="none" spc="0" normalizeH="0" baseline="0" noProof="0" dirty="0">
                           <a:ln>
                             <a:noFill/>
                           </a:ln>
@@ -18904,7 +19187,7 @@
                         <a:t>a</a:t>
                       </a:r>
                       <a:r>
-                        <a:rPr kumimoji="0" lang="es-MX" sz="1050" b="1" i="0" u="none" strike="noStrike" kern="1200" cap="none" spc="0" normalizeH="0" baseline="0" noProof="0" dirty="0" smtClean="0">
+                        <a:rPr kumimoji="0" lang="es-MX" sz="1050" b="1" i="0" u="none" strike="noStrike" kern="1200" cap="none" spc="0" normalizeH="0" baseline="0" noProof="0" dirty="0">
                           <a:ln>
                             <a:noFill/>
                           </a:ln>
@@ -18962,6 +19245,11 @@
                     </a:lnB>
                   </a:tcPr>
                 </a:tc>
+                <a:extLst>
+                  <a:ext uri="{0D108BD9-81ED-4DB2-BD59-A6C34878D82A}">
+                    <a16:rowId xmlns:a16="http://schemas.microsoft.com/office/drawing/2014/main" val="10001"/>
+                  </a:ext>
+                </a:extLst>
               </a:tr>
             </a:tbl>
           </a:graphicData>
@@ -18992,8 +19280,20 @@
                 <a:tableStyleId>{3B4B98B0-60AC-42C2-AFA5-B58CD77FA1E5}</a:tableStyleId>
               </a:tblPr>
               <a:tblGrid>
-                <a:gridCol w="615815"/>
-                <a:gridCol w="615815"/>
+                <a:gridCol w="615815">
+                  <a:extLst>
+                    <a:ext uri="{9D8B030D-6E8A-4147-A177-3AD203B41FA5}">
+                      <a16:colId xmlns:a16="http://schemas.microsoft.com/office/drawing/2014/main" val="20000"/>
+                    </a:ext>
+                  </a:extLst>
+                </a:gridCol>
+                <a:gridCol w="615815">
+                  <a:extLst>
+                    <a:ext uri="{9D8B030D-6E8A-4147-A177-3AD203B41FA5}">
+                      <a16:colId xmlns:a16="http://schemas.microsoft.com/office/drawing/2014/main" val="20001"/>
+                    </a:ext>
+                  </a:extLst>
+                </a:gridCol>
               </a:tblGrid>
               <a:tr h="411634">
                 <a:tc>
@@ -19003,7 +19303,7 @@
                     <a:p>
                       <a:pPr algn="ctr"/>
                       <a:r>
-                        <a:rPr kumimoji="0" lang="es-MX" sz="1800" b="1" i="0" u="none" strike="noStrike" kern="1200" cap="none" spc="0" normalizeH="0" baseline="0" noProof="0" dirty="0" smtClean="0">
+                        <a:rPr kumimoji="0" lang="es-MX" sz="1800" b="1" i="0" u="none" strike="noStrike" kern="1200" cap="none" spc="0" normalizeH="0" baseline="0" noProof="0" dirty="0">
                           <a:ln>
                             <a:noFill/>
                           </a:ln>
@@ -19020,7 +19320,7 @@
                         <a:t>a</a:t>
                       </a:r>
                       <a:r>
-                        <a:rPr kumimoji="0" lang="es-MX" sz="1050" b="1" i="0" u="none" strike="noStrike" kern="1200" cap="none" spc="0" normalizeH="0" baseline="0" noProof="0" dirty="0" smtClean="0">
+                        <a:rPr kumimoji="0" lang="es-MX" sz="1050" b="1" i="0" u="none" strike="noStrike" kern="1200" cap="none" spc="0" normalizeH="0" baseline="0" noProof="0" dirty="0">
                           <a:ln>
                             <a:noFill/>
                           </a:ln>
@@ -19085,7 +19385,7 @@
                     <a:p>
                       <a:pPr algn="ctr"/>
                       <a:r>
-                        <a:rPr kumimoji="0" lang="es-MX" sz="1800" b="1" i="0" u="none" strike="noStrike" kern="1200" cap="none" spc="0" normalizeH="0" baseline="0" noProof="0" dirty="0" smtClean="0">
+                        <a:rPr kumimoji="0" lang="es-MX" sz="1800" b="1" i="0" u="none" strike="noStrike" kern="1200" cap="none" spc="0" normalizeH="0" baseline="0" noProof="0" dirty="0">
                           <a:ln>
                             <a:noFill/>
                           </a:ln>
@@ -19102,7 +19402,7 @@
                         <a:t>a</a:t>
                       </a:r>
                       <a:r>
-                        <a:rPr kumimoji="0" lang="es-MX" sz="1050" b="1" i="0" u="none" strike="noStrike" kern="1200" cap="none" spc="0" normalizeH="0" baseline="0" noProof="0" dirty="0" smtClean="0">
+                        <a:rPr kumimoji="0" lang="es-MX" sz="1050" b="1" i="0" u="none" strike="noStrike" kern="1200" cap="none" spc="0" normalizeH="0" baseline="0" noProof="0" dirty="0">
                           <a:ln>
                             <a:noFill/>
                           </a:ln>
@@ -19160,6 +19460,11 @@
                     </a:lnB>
                   </a:tcPr>
                 </a:tc>
+                <a:extLst>
+                  <a:ext uri="{0D108BD9-81ED-4DB2-BD59-A6C34878D82A}">
+                    <a16:rowId xmlns:a16="http://schemas.microsoft.com/office/drawing/2014/main" val="10000"/>
+                  </a:ext>
+                </a:extLst>
               </a:tr>
               <a:tr h="411634">
                 <a:tc>
@@ -19169,7 +19474,7 @@
                     <a:p>
                       <a:pPr algn="ctr"/>
                       <a:r>
-                        <a:rPr kumimoji="0" lang="es-MX" sz="1800" b="1" i="0" u="none" strike="noStrike" kern="1200" cap="none" spc="0" normalizeH="0" baseline="0" noProof="0" dirty="0" smtClean="0">
+                        <a:rPr kumimoji="0" lang="es-MX" sz="1800" b="1" i="0" u="none" strike="noStrike" kern="1200" cap="none" spc="0" normalizeH="0" baseline="0" noProof="0" dirty="0">
                           <a:ln>
                             <a:noFill/>
                           </a:ln>
@@ -19186,7 +19491,7 @@
                         <a:t>a</a:t>
                       </a:r>
                       <a:r>
-                        <a:rPr kumimoji="0" lang="es-MX" sz="1050" b="1" i="0" u="none" strike="noStrike" kern="1200" cap="none" spc="0" normalizeH="0" baseline="0" noProof="0" dirty="0" smtClean="0">
+                        <a:rPr kumimoji="0" lang="es-MX" sz="1050" b="1" i="0" u="none" strike="noStrike" kern="1200" cap="none" spc="0" normalizeH="0" baseline="0" noProof="0" dirty="0">
                           <a:ln>
                             <a:noFill/>
                           </a:ln>
@@ -19251,7 +19556,7 @@
                     <a:p>
                       <a:pPr algn="ctr"/>
                       <a:r>
-                        <a:rPr kumimoji="0" lang="es-MX" sz="1800" b="1" i="0" u="none" strike="noStrike" kern="1200" cap="none" spc="0" normalizeH="0" baseline="0" noProof="0" dirty="0" smtClean="0">
+                        <a:rPr kumimoji="0" lang="es-MX" sz="1800" b="1" i="0" u="none" strike="noStrike" kern="1200" cap="none" spc="0" normalizeH="0" baseline="0" noProof="0" dirty="0">
                           <a:ln>
                             <a:noFill/>
                           </a:ln>
@@ -19268,7 +19573,7 @@
                         <a:t>a</a:t>
                       </a:r>
                       <a:r>
-                        <a:rPr kumimoji="0" lang="es-MX" sz="1050" b="1" i="0" u="none" strike="noStrike" kern="1200" cap="none" spc="0" normalizeH="0" baseline="0" noProof="0" dirty="0" smtClean="0">
+                        <a:rPr kumimoji="0" lang="es-MX" sz="1050" b="1" i="0" u="none" strike="noStrike" kern="1200" cap="none" spc="0" normalizeH="0" baseline="0" noProof="0" dirty="0">
                           <a:ln>
                             <a:noFill/>
                           </a:ln>
@@ -19326,6 +19631,11 @@
                     </a:lnB>
                   </a:tcPr>
                 </a:tc>
+                <a:extLst>
+                  <a:ext uri="{0D108BD9-81ED-4DB2-BD59-A6C34878D82A}">
+                    <a16:rowId xmlns:a16="http://schemas.microsoft.com/office/drawing/2014/main" val="10001"/>
+                  </a:ext>
+                </a:extLst>
               </a:tr>
             </a:tbl>
           </a:graphicData>
@@ -19391,7 +19701,13 @@
                 <a:tableStyleId>{BC89EF96-8CEA-46FF-86C4-4CE0E7609802}</a:tableStyleId>
               </a:tblPr>
               <a:tblGrid>
-                <a:gridCol w="571434"/>
+                <a:gridCol w="571434">
+                  <a:extLst>
+                    <a:ext uri="{9D8B030D-6E8A-4147-A177-3AD203B41FA5}">
+                      <a16:colId xmlns:a16="http://schemas.microsoft.com/office/drawing/2014/main" val="20000"/>
+                    </a:ext>
+                  </a:extLst>
+                </a:gridCol>
               </a:tblGrid>
               <a:tr h="489397">
                 <a:tc>
@@ -19401,7 +19717,7 @@
                     <a:p>
                       <a:pPr algn="ctr"/>
                       <a:r>
-                        <a:rPr kumimoji="0" lang="es-MX" sz="1800" b="1" i="0" u="none" strike="noStrike" kern="1200" cap="none" spc="0" normalizeH="0" baseline="0" noProof="0" dirty="0" smtClean="0">
+                        <a:rPr kumimoji="0" lang="es-MX" sz="1800" b="1" i="0" u="none" strike="noStrike" kern="1200" cap="none" spc="0" normalizeH="0" baseline="0" noProof="0" dirty="0">
                           <a:ln>
                             <a:noFill/>
                           </a:ln>
@@ -19418,7 +19734,7 @@
                         <a:t>a</a:t>
                       </a:r>
                       <a:r>
-                        <a:rPr kumimoji="0" lang="es-MX" sz="1050" b="1" i="0" u="none" strike="noStrike" kern="1200" cap="none" spc="0" normalizeH="0" baseline="0" noProof="0" dirty="0" smtClean="0">
+                        <a:rPr kumimoji="0" lang="es-MX" sz="1050" b="1" i="0" u="none" strike="noStrike" kern="1200" cap="none" spc="0" normalizeH="0" baseline="0" noProof="0" dirty="0">
                           <a:ln>
                             <a:noFill/>
                           </a:ln>
@@ -19439,6 +19755,11 @@
                   </a:txBody>
                   <a:tcPr anchor="ctr"/>
                 </a:tc>
+                <a:extLst>
+                  <a:ext uri="{0D108BD9-81ED-4DB2-BD59-A6C34878D82A}">
+                    <a16:rowId xmlns:a16="http://schemas.microsoft.com/office/drawing/2014/main" val="10000"/>
+                  </a:ext>
+                </a:extLst>
               </a:tr>
             </a:tbl>
           </a:graphicData>
@@ -19469,7 +19790,13 @@
                 <a:tableStyleId>{BC89EF96-8CEA-46FF-86C4-4CE0E7609802}</a:tableStyleId>
               </a:tblPr>
               <a:tblGrid>
-                <a:gridCol w="575890"/>
+                <a:gridCol w="575890">
+                  <a:extLst>
+                    <a:ext uri="{9D8B030D-6E8A-4147-A177-3AD203B41FA5}">
+                      <a16:colId xmlns:a16="http://schemas.microsoft.com/office/drawing/2014/main" val="20000"/>
+                    </a:ext>
+                  </a:extLst>
+                </a:gridCol>
               </a:tblGrid>
               <a:tr h="489397">
                 <a:tc>
@@ -19479,7 +19806,7 @@
                     <a:p>
                       <a:pPr algn="ctr"/>
                       <a:r>
-                        <a:rPr kumimoji="0" lang="es-MX" sz="1800" b="1" i="0" u="none" strike="noStrike" kern="1200" cap="none" spc="0" normalizeH="0" baseline="0" noProof="0" dirty="0" smtClean="0">
+                        <a:rPr kumimoji="0" lang="es-MX" sz="1800" b="1" i="0" u="none" strike="noStrike" kern="1200" cap="none" spc="0" normalizeH="0" baseline="0" noProof="0" dirty="0">
                           <a:ln>
                             <a:noFill/>
                           </a:ln>
@@ -19496,7 +19823,7 @@
                         <a:t>a</a:t>
                       </a:r>
                       <a:r>
-                        <a:rPr kumimoji="0" lang="es-MX" sz="1050" b="1" i="0" u="none" strike="noStrike" kern="1200" cap="none" spc="0" normalizeH="0" baseline="0" noProof="0" dirty="0" smtClean="0">
+                        <a:rPr kumimoji="0" lang="es-MX" sz="1050" b="1" i="0" u="none" strike="noStrike" kern="1200" cap="none" spc="0" normalizeH="0" baseline="0" noProof="0" dirty="0">
                           <a:ln>
                             <a:noFill/>
                           </a:ln>
@@ -19517,6 +19844,11 @@
                   </a:txBody>
                   <a:tcPr anchor="ctr"/>
                 </a:tc>
+                <a:extLst>
+                  <a:ext uri="{0D108BD9-81ED-4DB2-BD59-A6C34878D82A}">
+                    <a16:rowId xmlns:a16="http://schemas.microsoft.com/office/drawing/2014/main" val="10000"/>
+                  </a:ext>
+                </a:extLst>
               </a:tr>
             </a:tbl>
           </a:graphicData>
@@ -19754,13 +20086,6 @@
   <p:clrMapOvr>
     <a:masterClrMapping/>
   </p:clrMapOvr>
-  <p:timing>
-    <p:tnLst>
-      <p:par>
-        <p:cTn id="1" dur="indefinite" restart="never" nodeType="tmRoot"/>
-      </p:par>
-    </p:tnLst>
-  </p:timing>
 </p:sld>
 </file>
 
@@ -19797,7 +20122,7 @@
           <a:lstStyle/>
           <a:p>
             <a:r>
-              <a:rPr lang="es-MX" dirty="0" smtClean="0"/>
+              <a:rPr lang="es-MX" dirty="0"/>
               <a:t>Algoritmo</a:t>
             </a:r>
             <a:endParaRPr lang="es-ES" dirty="0"/>
@@ -19827,35 +20152,35 @@
           <a:lstStyle/>
           <a:p>
             <a:r>
-              <a:rPr lang="es-MX" dirty="0" err="1" smtClean="0"/>
+              <a:rPr lang="es-MX" dirty="0" err="1"/>
               <a:t>Int</a:t>
             </a:r>
             <a:r>
-              <a:rPr lang="es-MX" dirty="0" smtClean="0"/>
+              <a:rPr lang="es-MX" dirty="0"/>
               <a:t> Determinante(</a:t>
             </a:r>
             <a:r>
-              <a:rPr lang="es-MX" dirty="0" err="1" smtClean="0"/>
+              <a:rPr lang="es-MX" dirty="0" err="1"/>
               <a:t>int</a:t>
             </a:r>
             <a:r>
-              <a:rPr lang="es-MX" dirty="0" smtClean="0"/>
+              <a:rPr lang="es-MX" dirty="0"/>
               <a:t> dimensión, </a:t>
             </a:r>
             <a:r>
-              <a:rPr lang="es-MX" dirty="0" err="1" smtClean="0"/>
+              <a:rPr lang="es-MX" dirty="0" err="1"/>
               <a:t>int</a:t>
             </a:r>
             <a:r>
-              <a:rPr lang="es-MX" dirty="0" smtClean="0"/>
+              <a:rPr lang="es-MX" dirty="0"/>
               <a:t> matriz[][</a:t>
             </a:r>
             <a:r>
-              <a:rPr lang="es-MX" dirty="0" err="1" smtClean="0"/>
+              <a:rPr lang="es-MX" dirty="0" err="1"/>
               <a:t>tam_maximo</a:t>
             </a:r>
             <a:r>
-              <a:rPr lang="es-MX" dirty="0" smtClean="0"/>
+              <a:rPr lang="es-MX" dirty="0"/>
               <a:t>]){</a:t>
             </a:r>
           </a:p>
@@ -19864,11 +20189,11 @@
               <a:buNone/>
             </a:pPr>
             <a:r>
-              <a:rPr lang="es-MX" dirty="0" err="1" smtClean="0"/>
+              <a:rPr lang="es-MX" dirty="0" err="1"/>
               <a:t>If</a:t>
             </a:r>
             <a:r>
-              <a:rPr lang="es-MX" dirty="0" smtClean="0"/>
+              <a:rPr lang="es-MX" dirty="0"/>
               <a:t>(dimensión==1)</a:t>
             </a:r>
           </a:p>
@@ -19881,11 +20206,11 @@
               <a:t>	</a:t>
             </a:r>
             <a:r>
-              <a:rPr lang="es-MX" dirty="0" err="1" smtClean="0"/>
+              <a:rPr lang="es-MX" dirty="0" err="1"/>
               <a:t>return</a:t>
             </a:r>
             <a:r>
-              <a:rPr lang="es-MX" dirty="0" smtClean="0"/>
+              <a:rPr lang="es-MX" dirty="0"/>
               <a:t> matriz[0][0]</a:t>
             </a:r>
           </a:p>
@@ -19894,11 +20219,11 @@
               <a:buNone/>
             </a:pPr>
             <a:r>
-              <a:rPr lang="es-MX" dirty="0" err="1" smtClean="0"/>
+              <a:rPr lang="es-MX" dirty="0" err="1"/>
               <a:t>Else</a:t>
             </a:r>
             <a:r>
-              <a:rPr lang="es-MX" dirty="0" smtClean="0"/>
+              <a:rPr lang="es-MX" dirty="0"/>
               <a:t>{</a:t>
             </a:r>
           </a:p>
@@ -19911,19 +20236,19 @@
               <a:t>	</a:t>
             </a:r>
             <a:r>
-              <a:rPr lang="es-MX" dirty="0" err="1" smtClean="0"/>
+              <a:rPr lang="es-MX" dirty="0" err="1"/>
               <a:t>int</a:t>
             </a:r>
             <a:r>
-              <a:rPr lang="es-MX" dirty="0" smtClean="0"/>
+              <a:rPr lang="es-MX" dirty="0"/>
               <a:t> </a:t>
             </a:r>
             <a:r>
-              <a:rPr lang="es-MX" dirty="0" err="1" smtClean="0"/>
+              <a:rPr lang="es-MX" dirty="0" err="1"/>
               <a:t>aux</a:t>
             </a:r>
             <a:r>
-              <a:rPr lang="es-MX" dirty="0" smtClean="0"/>
+              <a:rPr lang="es-MX" dirty="0"/>
               <a:t>=0</a:t>
             </a:r>
           </a:p>
@@ -19936,27 +20261,27 @@
               <a:t>	</a:t>
             </a:r>
             <a:r>
-              <a:rPr lang="es-MX" dirty="0" err="1" smtClean="0"/>
+              <a:rPr lang="es-MX" dirty="0" err="1"/>
               <a:t>for</a:t>
             </a:r>
             <a:r>
-              <a:rPr lang="es-MX" dirty="0" smtClean="0"/>
+              <a:rPr lang="es-MX" dirty="0"/>
               <a:t>(</a:t>
             </a:r>
             <a:r>
-              <a:rPr lang="es-MX" dirty="0" err="1" smtClean="0"/>
+              <a:rPr lang="es-MX" dirty="0" err="1"/>
               <a:t>int</a:t>
             </a:r>
             <a:r>
-              <a:rPr lang="es-MX" dirty="0" smtClean="0"/>
+              <a:rPr lang="es-MX" dirty="0"/>
               <a:t> i=1;i&lt;=</a:t>
             </a:r>
             <a:r>
-              <a:rPr lang="es-MX" dirty="0" err="1" smtClean="0"/>
+              <a:rPr lang="es-MX" dirty="0" err="1"/>
               <a:t>dimensión;i</a:t>
             </a:r>
             <a:r>
-              <a:rPr lang="es-MX" dirty="0" smtClean="0"/>
+              <a:rPr lang="es-MX" dirty="0"/>
               <a:t>++){</a:t>
             </a:r>
           </a:p>
@@ -19966,26 +20291,22 @@
             </a:pPr>
             <a:r>
               <a:rPr lang="es-MX" dirty="0"/>
-              <a:t>	</a:t>
-            </a:r>
-            <a:r>
-              <a:rPr lang="es-MX" dirty="0" smtClean="0"/>
-              <a:t>	</a:t>
-            </a:r>
-            <a:r>
-              <a:rPr lang="es-MX" dirty="0" err="1" smtClean="0"/>
+              <a:t>		</a:t>
+            </a:r>
+            <a:r>
+              <a:rPr lang="es-MX" dirty="0" err="1"/>
               <a:t>int</a:t>
             </a:r>
             <a:r>
-              <a:rPr lang="es-MX" dirty="0" smtClean="0"/>
+              <a:rPr lang="es-MX" dirty="0"/>
               <a:t> </a:t>
             </a:r>
             <a:r>
-              <a:rPr lang="es-MX" dirty="0" err="1" smtClean="0"/>
+              <a:rPr lang="es-MX" dirty="0" err="1"/>
               <a:t>matrizAux</a:t>
             </a:r>
             <a:r>
-              <a:rPr lang="es-MX" dirty="0" smtClean="0"/>
+              <a:rPr lang="es-MX" dirty="0"/>
               <a:t>[dimensión-1][</a:t>
             </a:r>
             <a:r>
@@ -19993,7 +20314,7 @@
               <a:t>tam_maximo</a:t>
             </a:r>
             <a:r>
-              <a:rPr lang="es-MX" dirty="0" smtClean="0"/>
+              <a:rPr lang="es-MX" dirty="0"/>
               <a:t>];</a:t>
             </a:r>
           </a:p>
@@ -20002,23 +20323,23 @@
               <a:buNone/>
             </a:pPr>
             <a:r>
-              <a:rPr lang="es-MX" dirty="0" smtClean="0"/>
+              <a:rPr lang="es-MX" dirty="0"/>
               <a:t>			</a:t>
             </a:r>
             <a:r>
-              <a:rPr lang="es-MX" dirty="0" err="1" smtClean="0"/>
+              <a:rPr lang="es-MX" dirty="0" err="1"/>
               <a:t>for</a:t>
             </a:r>
             <a:r>
-              <a:rPr lang="es-MX" dirty="0" smtClean="0"/>
+              <a:rPr lang="es-MX" dirty="0"/>
               <a:t>(</a:t>
             </a:r>
             <a:r>
-              <a:rPr lang="es-MX" dirty="0" err="1" smtClean="0"/>
+              <a:rPr lang="es-MX" dirty="0" err="1"/>
               <a:t>int</a:t>
             </a:r>
             <a:r>
-              <a:rPr lang="es-MX" dirty="0" smtClean="0"/>
+              <a:rPr lang="es-MX" dirty="0"/>
               <a:t> j=1;j&lt;=dimensión-1;j++){</a:t>
             </a:r>
           </a:p>
@@ -20028,26 +20349,22 @@
             </a:pPr>
             <a:r>
               <a:rPr lang="es-MX" dirty="0"/>
-              <a:t>	</a:t>
-            </a:r>
-            <a:r>
-              <a:rPr lang="es-MX" dirty="0" smtClean="0"/>
-              <a:t>			</a:t>
-            </a:r>
-            <a:r>
-              <a:rPr lang="es-MX" dirty="0" err="1" smtClean="0"/>
+              <a:t>				</a:t>
+            </a:r>
+            <a:r>
+              <a:rPr lang="es-MX" dirty="0" err="1"/>
               <a:t>for</a:t>
             </a:r>
             <a:r>
-              <a:rPr lang="es-MX" dirty="0" smtClean="0"/>
+              <a:rPr lang="es-MX" dirty="0"/>
               <a:t>(</a:t>
             </a:r>
             <a:r>
-              <a:rPr lang="es-MX" dirty="0" err="1" smtClean="0"/>
+              <a:rPr lang="es-MX" dirty="0" err="1"/>
               <a:t>int</a:t>
             </a:r>
             <a:r>
-              <a:rPr lang="es-MX" dirty="0" smtClean="0"/>
+              <a:rPr lang="es-MX" dirty="0"/>
               <a:t> k=1;&lt;=dimensión-1;j++{</a:t>
             </a:r>
           </a:p>
@@ -20055,7 +20372,7 @@
             <a:pPr marL="457200" lvl="1" indent="0">
               <a:buNone/>
             </a:pPr>
-            <a:endParaRPr lang="es-MX" dirty="0" smtClean="0"/>
+            <a:endParaRPr lang="es-MX" dirty="0"/>
           </a:p>
           <a:p>
             <a:pPr marL="457200" lvl="1" indent="0">
@@ -20063,11 +20380,7 @@
             </a:pPr>
             <a:r>
               <a:rPr lang="es-MX" dirty="0"/>
-              <a:t>	</a:t>
-            </a:r>
-            <a:r>
-              <a:rPr lang="es-MX" dirty="0" smtClean="0"/>
-              <a:t>			}</a:t>
+              <a:t>				}</a:t>
             </a:r>
           </a:p>
           <a:p>
@@ -20076,11 +20389,7 @@
             </a:pPr>
             <a:r>
               <a:rPr lang="es-MX" dirty="0"/>
-              <a:t>	</a:t>
-            </a:r>
-            <a:r>
-              <a:rPr lang="es-MX" dirty="0" smtClean="0"/>
-              <a:t>		}</a:t>
+              <a:t>			}</a:t>
             </a:r>
           </a:p>
           <a:p>
@@ -20089,46 +20398,30 @@
             </a:pPr>
             <a:r>
               <a:rPr lang="es-MX" dirty="0"/>
-              <a:t>	</a:t>
-            </a:r>
-            <a:r>
-              <a:rPr lang="es-MX" dirty="0" smtClean="0"/>
-              <a:t>	</a:t>
-            </a:r>
-            <a:r>
-              <a:rPr lang="es-MX" dirty="0" err="1" smtClean="0"/>
+              <a:t>		</a:t>
+            </a:r>
+            <a:r>
+              <a:rPr lang="es-MX" dirty="0" err="1"/>
               <a:t>aux</a:t>
             </a:r>
             <a:r>
-              <a:rPr lang="es-MX" dirty="0" smtClean="0"/>
+              <a:rPr lang="es-MX" dirty="0"/>
               <a:t>=</a:t>
             </a:r>
             <a:r>
-              <a:rPr lang="es-MX" dirty="0" err="1" smtClean="0"/>
+              <a:rPr lang="es-MX" dirty="0" err="1"/>
               <a:t>aux</a:t>
             </a:r>
             <a:r>
-              <a:rPr lang="es-MX" dirty="0" smtClean="0"/>
-              <a:t>+</a:t>
-            </a:r>
-            <a:r>
               <a:rPr lang="es-MX" dirty="0"/>
-              <a:t>(-1)^(1+i</a:t>
-            </a:r>
-            <a:r>
-              <a:rPr lang="es-MX" dirty="0" smtClean="0"/>
-              <a:t>)*matriz[0][i-1]*determinante(dimensión-1,</a:t>
-            </a:r>
-            <a:r>
-              <a:rPr lang="es-MX" dirty="0"/>
-              <a:t> </a:t>
+              <a:t>+(-1)^(1+i)*matriz[0][i-1]*determinante(dimensión-1, </a:t>
             </a:r>
             <a:r>
               <a:rPr lang="es-MX" dirty="0" err="1"/>
               <a:t>matrizAux</a:t>
             </a:r>
             <a:r>
-              <a:rPr lang="es-MX" dirty="0" smtClean="0"/>
+              <a:rPr lang="es-MX" dirty="0"/>
               <a:t>);</a:t>
             </a:r>
             <a:endParaRPr lang="es-ES" dirty="0"/>
@@ -20137,7 +20430,7 @@
             <a:pPr marL="457200" lvl="1" indent="0">
               <a:buNone/>
             </a:pPr>
-            <a:endParaRPr lang="es-MX" dirty="0" smtClean="0"/>
+            <a:endParaRPr lang="es-MX" dirty="0"/>
           </a:p>
           <a:p>
             <a:pPr marL="457200" lvl="1" indent="0">
@@ -20145,11 +20438,7 @@
             </a:pPr>
             <a:r>
               <a:rPr lang="es-MX" dirty="0"/>
-              <a:t>	</a:t>
-            </a:r>
-            <a:r>
-              <a:rPr lang="es-MX" dirty="0" smtClean="0"/>
-              <a:t>}</a:t>
+              <a:t>	}</a:t>
             </a:r>
           </a:p>
           <a:p>
@@ -20213,7 +20502,7 @@
         </p:spPr>
         <p:txBody>
           <a:bodyPr>
-            <a:normAutofit/>
+            <a:normAutofit fontScale="62500" lnSpcReduction="20000"/>
           </a:bodyPr>
           <a:lstStyle>
             <a:lvl1pPr marL="342900" indent="-342900" algn="l" defTabSz="457200" rtl="0" eaLnBrk="1" latinLnBrk="0" hangingPunct="1">
@@ -20444,35 +20733,35 @@
           </a:lstStyle>
           <a:p>
             <a:r>
-              <a:rPr lang="es-MX" dirty="0" err="1" smtClean="0"/>
+              <a:rPr lang="es-MX" dirty="0" err="1"/>
               <a:t>Int</a:t>
             </a:r>
             <a:r>
-              <a:rPr lang="es-MX" dirty="0" smtClean="0"/>
+              <a:rPr lang="es-MX" dirty="0"/>
               <a:t> Determinante(</a:t>
             </a:r>
             <a:r>
-              <a:rPr lang="es-MX" dirty="0" err="1" smtClean="0"/>
+              <a:rPr lang="es-MX" dirty="0" err="1"/>
               <a:t>int</a:t>
             </a:r>
             <a:r>
-              <a:rPr lang="es-MX" dirty="0" smtClean="0"/>
+              <a:rPr lang="es-MX" dirty="0"/>
               <a:t> dimensión, </a:t>
             </a:r>
             <a:r>
-              <a:rPr lang="es-MX" dirty="0" err="1" smtClean="0"/>
+              <a:rPr lang="es-MX" dirty="0" err="1"/>
               <a:t>int</a:t>
             </a:r>
             <a:r>
-              <a:rPr lang="es-MX" dirty="0" smtClean="0"/>
+              <a:rPr lang="es-MX" dirty="0"/>
               <a:t> matriz[][</a:t>
             </a:r>
             <a:r>
-              <a:rPr lang="es-MX" dirty="0" err="1" smtClean="0"/>
+              <a:rPr lang="es-MX" dirty="0" err="1"/>
               <a:t>tam_maximo</a:t>
             </a:r>
             <a:r>
-              <a:rPr lang="es-MX" dirty="0" smtClean="0"/>
+              <a:rPr lang="es-MX" dirty="0"/>
               <a:t>]){</a:t>
             </a:r>
           </a:p>
@@ -20482,11 +20771,11 @@
               <a:buNone/>
             </a:pPr>
             <a:r>
-              <a:rPr lang="es-MX" dirty="0" err="1" smtClean="0"/>
+              <a:rPr lang="es-MX" dirty="0" err="1"/>
               <a:t>If</a:t>
             </a:r>
             <a:r>
-              <a:rPr lang="es-MX" dirty="0" smtClean="0"/>
+              <a:rPr lang="es-MX" dirty="0"/>
               <a:t>(dimensión==1)</a:t>
             </a:r>
           </a:p>
@@ -20496,15 +20785,15 @@
               <a:buNone/>
             </a:pPr>
             <a:r>
-              <a:rPr lang="es-MX" dirty="0" smtClean="0"/>
+              <a:rPr lang="es-MX" dirty="0"/>
               <a:t>	</a:t>
             </a:r>
             <a:r>
-              <a:rPr lang="es-MX" dirty="0" err="1" smtClean="0"/>
+              <a:rPr lang="es-MX" dirty="0" err="1"/>
               <a:t>return</a:t>
             </a:r>
             <a:r>
-              <a:rPr lang="es-MX" dirty="0" smtClean="0"/>
+              <a:rPr lang="es-MX" dirty="0"/>
               <a:t> matriz[0][0]</a:t>
             </a:r>
           </a:p>
@@ -20514,11 +20803,11 @@
               <a:buNone/>
             </a:pPr>
             <a:r>
-              <a:rPr lang="es-MX" dirty="0" err="1" smtClean="0"/>
+              <a:rPr lang="es-MX" dirty="0" err="1"/>
               <a:t>Else</a:t>
             </a:r>
             <a:r>
-              <a:rPr lang="es-MX" dirty="0" smtClean="0"/>
+              <a:rPr lang="es-MX" dirty="0"/>
               <a:t>{</a:t>
             </a:r>
           </a:p>
@@ -20528,23 +20817,23 @@
               <a:buNone/>
             </a:pPr>
             <a:r>
-              <a:rPr lang="es-MX" dirty="0" smtClean="0"/>
+              <a:rPr lang="es-MX" dirty="0"/>
               <a:t>	</a:t>
             </a:r>
             <a:r>
-              <a:rPr lang="es-MX" dirty="0" err="1" smtClean="0"/>
+              <a:rPr lang="es-MX" dirty="0" err="1"/>
               <a:t>int</a:t>
             </a:r>
             <a:r>
-              <a:rPr lang="es-MX" dirty="0" smtClean="0"/>
+              <a:rPr lang="es-MX" dirty="0"/>
               <a:t> </a:t>
             </a:r>
             <a:r>
-              <a:rPr lang="es-MX" dirty="0" err="1" smtClean="0"/>
+              <a:rPr lang="es-MX" dirty="0" err="1"/>
               <a:t>aux</a:t>
             </a:r>
             <a:r>
-              <a:rPr lang="es-MX" dirty="0" smtClean="0"/>
+              <a:rPr lang="es-MX" dirty="0"/>
               <a:t>=0</a:t>
             </a:r>
           </a:p>
@@ -20554,31 +20843,31 @@
               <a:buNone/>
             </a:pPr>
             <a:r>
-              <a:rPr lang="es-MX" dirty="0" smtClean="0"/>
+              <a:rPr lang="es-MX" dirty="0"/>
               <a:t>	</a:t>
             </a:r>
             <a:r>
-              <a:rPr lang="es-MX" dirty="0" err="1" smtClean="0"/>
+              <a:rPr lang="es-MX" dirty="0" err="1"/>
               <a:t>for</a:t>
             </a:r>
             <a:r>
-              <a:rPr lang="es-MX" dirty="0" smtClean="0"/>
+              <a:rPr lang="es-MX" dirty="0"/>
               <a:t>(</a:t>
             </a:r>
             <a:r>
-              <a:rPr lang="es-MX" dirty="0" err="1" smtClean="0"/>
+              <a:rPr lang="es-MX" dirty="0" err="1"/>
               <a:t>int</a:t>
             </a:r>
             <a:r>
-              <a:rPr lang="es-MX" dirty="0" smtClean="0"/>
+              <a:rPr lang="es-MX" dirty="0"/>
               <a:t> i=1;i&lt;=</a:t>
             </a:r>
             <a:r>
-              <a:rPr lang="es-MX" dirty="0" err="1" smtClean="0"/>
+              <a:rPr lang="es-MX" dirty="0" err="1"/>
               <a:t>dimensión;i</a:t>
             </a:r>
             <a:r>
-              <a:rPr lang="es-MX" dirty="0" smtClean="0"/>
+              <a:rPr lang="es-MX" dirty="0"/>
               <a:t>++){</a:t>
             </a:r>
           </a:p>
@@ -20588,32 +20877,8 @@
               <a:buNone/>
             </a:pPr>
             <a:r>
-              <a:rPr lang="es-MX" dirty="0" smtClean="0"/>
+              <a:rPr lang="es-MX" dirty="0"/>
               <a:t>		</a:t>
-            </a:r>
-            <a:r>
-              <a:rPr lang="es-MX" dirty="0" err="1" smtClean="0"/>
-              <a:t>int</a:t>
-            </a:r>
-            <a:r>
-              <a:rPr lang="es-MX" dirty="0" smtClean="0"/>
-              <a:t> </a:t>
-            </a:r>
-            <a:r>
-              <a:rPr lang="es-MX" dirty="0" err="1" smtClean="0"/>
-              <a:t>matrizAux</a:t>
-            </a:r>
-            <a:r>
-              <a:rPr lang="es-MX" dirty="0" smtClean="0"/>
-              <a:t>[dimensión-1][</a:t>
-            </a:r>
-            <a:r>
-              <a:rPr lang="es-MX" dirty="0" err="1" smtClean="0"/>
-              <a:t>tam_maximo</a:t>
-            </a:r>
-            <a:r>
-              <a:rPr lang="es-MX" dirty="0" smtClean="0"/>
-              <a:t>];</a:t>
             </a:r>
           </a:p>
           <a:p>
@@ -20622,24 +20887,32 @@
               <a:buNone/>
             </a:pPr>
             <a:r>
-              <a:rPr lang="es-MX" dirty="0" smtClean="0"/>
-              <a:t>			</a:t>
-            </a:r>
-            <a:r>
-              <a:rPr lang="es-MX" dirty="0" err="1" smtClean="0"/>
-              <a:t>for</a:t>
-            </a:r>
-            <a:r>
-              <a:rPr lang="es-MX" dirty="0" smtClean="0"/>
-              <a:t>(</a:t>
-            </a:r>
-            <a:r>
-              <a:rPr lang="es-MX" dirty="0" err="1" smtClean="0"/>
+              <a:rPr lang="es-MX" dirty="0"/>
+              <a:t>		</a:t>
+            </a:r>
+            <a:r>
+              <a:rPr lang="es-MX" dirty="0" err="1"/>
               <a:t>int</a:t>
             </a:r>
             <a:r>
-              <a:rPr lang="es-MX" dirty="0" smtClean="0"/>
-              <a:t> j=1;j&lt;=dimensión-1;j++){</a:t>
+              <a:rPr lang="es-MX" dirty="0"/>
+              <a:t> </a:t>
+            </a:r>
+            <a:r>
+              <a:rPr lang="es-MX" dirty="0" err="1"/>
+              <a:t>matrizAux</a:t>
+            </a:r>
+            <a:r>
+              <a:rPr lang="es-MX" dirty="0"/>
+              <a:t>[dimensión-1][</a:t>
+            </a:r>
+            <a:r>
+              <a:rPr lang="es-MX" dirty="0" err="1"/>
+              <a:t>tam_maximo</a:t>
+            </a:r>
+            <a:r>
+              <a:rPr lang="es-MX" dirty="0"/>
+              <a:t>];</a:t>
             </a:r>
           </a:p>
           <a:p>
@@ -20648,24 +20921,24 @@
               <a:buNone/>
             </a:pPr>
             <a:r>
-              <a:rPr lang="es-MX" dirty="0" smtClean="0"/>
-              <a:t>				</a:t>
-            </a:r>
-            <a:r>
-              <a:rPr lang="es-MX" dirty="0" err="1" smtClean="0"/>
+              <a:rPr lang="es-MX" dirty="0"/>
+              <a:t>			</a:t>
+            </a:r>
+            <a:r>
+              <a:rPr lang="es-MX" dirty="0" err="1"/>
               <a:t>for</a:t>
             </a:r>
             <a:r>
-              <a:rPr lang="es-MX" dirty="0" smtClean="0"/>
+              <a:rPr lang="es-MX" dirty="0"/>
               <a:t>(</a:t>
             </a:r>
             <a:r>
-              <a:rPr lang="es-MX" dirty="0" err="1" smtClean="0"/>
+              <a:rPr lang="es-MX" dirty="0" err="1"/>
               <a:t>int</a:t>
             </a:r>
             <a:r>
-              <a:rPr lang="es-MX" dirty="0" smtClean="0"/>
-              <a:t> k=1;&lt;=dimensión-1;j++{</a:t>
+              <a:rPr lang="es-MX" dirty="0"/>
+              <a:t> j=1;j&lt;=dimensión-1;j++){</a:t>
             </a:r>
           </a:p>
           <a:p>
@@ -20674,8 +20947,24 @@
               <a:buNone/>
             </a:pPr>
             <a:r>
-              <a:rPr lang="es-MX" dirty="0" smtClean="0"/>
-              <a:t>					</a:t>
+              <a:rPr lang="es-MX" dirty="0"/>
+              <a:t>				</a:t>
+            </a:r>
+            <a:r>
+              <a:rPr lang="es-MX" dirty="0" err="1"/>
+              <a:t>for</a:t>
+            </a:r>
+            <a:r>
+              <a:rPr lang="es-MX" dirty="0"/>
+              <a:t>(</a:t>
+            </a:r>
+            <a:r>
+              <a:rPr lang="es-MX" dirty="0" err="1"/>
+              <a:t>int</a:t>
+            </a:r>
+            <a:r>
+              <a:rPr lang="es-MX" dirty="0"/>
+              <a:t> k=1;k&lt;=dimensión-1;k++{</a:t>
             </a:r>
           </a:p>
           <a:p>
@@ -20684,7 +20973,169 @@
               <a:buNone/>
             </a:pPr>
             <a:r>
-              <a:rPr lang="es-MX" dirty="0" smtClean="0"/>
+              <a:rPr lang="es-MX" dirty="0"/>
+              <a:t>					</a:t>
+            </a:r>
+            <a:r>
+              <a:rPr lang="es-MX" dirty="0" err="1"/>
+              <a:t>if</a:t>
+            </a:r>
+            <a:r>
+              <a:rPr lang="es-MX" dirty="0"/>
+              <a:t>(i==1)</a:t>
+            </a:r>
+          </a:p>
+          <a:p>
+            <a:pPr marL="457200" lvl="1" indent="0">
+              <a:buNone/>
+            </a:pPr>
+            <a:r>
+              <a:rPr lang="es-MX" dirty="0"/>
+              <a:t>					 </a:t>
+            </a:r>
+            <a:r>
+              <a:rPr lang="es-MX" dirty="0" err="1"/>
+              <a:t>matrizAux</a:t>
+            </a:r>
+            <a:r>
+              <a:rPr lang="es-MX" dirty="0"/>
+              <a:t>[j-1][k-1]=matriz[j][k];</a:t>
+            </a:r>
+          </a:p>
+          <a:p>
+            <a:pPr marL="457200" lvl="1" indent="0">
+              <a:buNone/>
+            </a:pPr>
+            <a:r>
+              <a:rPr lang="es-MX" dirty="0"/>
+              <a:t>					</a:t>
+            </a:r>
+            <a:r>
+              <a:rPr lang="es-MX" dirty="0" err="1"/>
+              <a:t>else</a:t>
+            </a:r>
+            <a:r>
+              <a:rPr lang="es-MX" dirty="0"/>
+              <a:t> </a:t>
+            </a:r>
+            <a:r>
+              <a:rPr lang="es-MX" dirty="0" err="1"/>
+              <a:t>if</a:t>
+            </a:r>
+            <a:r>
+              <a:rPr lang="es-MX" dirty="0"/>
+              <a:t>(i==dimensión){</a:t>
+            </a:r>
+          </a:p>
+          <a:p>
+            <a:pPr marL="457200" lvl="1" indent="0">
+              <a:buNone/>
+            </a:pPr>
+            <a:r>
+              <a:rPr lang="es-MX" dirty="0"/>
+              <a:t>					 </a:t>
+            </a:r>
+            <a:r>
+              <a:rPr lang="es-MX" dirty="0" err="1"/>
+              <a:t>matrizAux</a:t>
+            </a:r>
+            <a:r>
+              <a:rPr lang="es-MX" dirty="0"/>
+              <a:t>[j-1][k-1]=matriz[j][k-1];</a:t>
+            </a:r>
+          </a:p>
+          <a:p>
+            <a:pPr marL="457200" lvl="1" indent="0">
+              <a:buNone/>
+            </a:pPr>
+            <a:r>
+              <a:rPr lang="es-MX" dirty="0"/>
+              <a:t>					</a:t>
+            </a:r>
+            <a:r>
+              <a:rPr lang="es-MX" dirty="0" err="1"/>
+              <a:t>else</a:t>
+            </a:r>
+            <a:r>
+              <a:rPr lang="es-MX" dirty="0"/>
+              <a:t>{</a:t>
+            </a:r>
+          </a:p>
+          <a:p>
+            <a:pPr marL="457200" lvl="1" indent="0">
+              <a:buNone/>
+            </a:pPr>
+            <a:r>
+              <a:rPr lang="es-MX" dirty="0"/>
+              <a:t>					</a:t>
+            </a:r>
+            <a:r>
+              <a:rPr lang="es-MX" dirty="0" err="1"/>
+              <a:t>Int</a:t>
+            </a:r>
+            <a:r>
+              <a:rPr lang="es-MX" dirty="0"/>
+              <a:t> a=0;</a:t>
+            </a:r>
+          </a:p>
+          <a:p>
+            <a:pPr marL="457200" lvl="1" indent="0">
+              <a:buNone/>
+            </a:pPr>
+            <a:r>
+              <a:rPr lang="es-MX" dirty="0"/>
+              <a:t>					</a:t>
+            </a:r>
+            <a:r>
+              <a:rPr lang="es-MX" dirty="0" err="1"/>
+              <a:t>if</a:t>
+            </a:r>
+            <a:r>
+              <a:rPr lang="es-MX" dirty="0"/>
+              <a:t>(k&gt;=i){</a:t>
+            </a:r>
+          </a:p>
+          <a:p>
+            <a:pPr marL="457200" lvl="1" indent="0">
+              <a:buNone/>
+            </a:pPr>
+            <a:r>
+              <a:rPr lang="es-MX" dirty="0"/>
+              <a:t>						a=1;</a:t>
+            </a:r>
+          </a:p>
+          <a:p>
+            <a:pPr marL="457200" lvl="1" indent="0">
+              <a:buNone/>
+            </a:pPr>
+            <a:r>
+              <a:rPr lang="es-MX" dirty="0"/>
+              <a:t>					}</a:t>
+            </a:r>
+          </a:p>
+          <a:p>
+            <a:pPr marL="457200" lvl="1" indent="0">
+              <a:buNone/>
+            </a:pPr>
+            <a:r>
+              <a:rPr lang="es-MX" dirty="0"/>
+              <a:t>					</a:t>
+            </a:r>
+            <a:r>
+              <a:rPr lang="es-MX" dirty="0" err="1"/>
+              <a:t>matrizAux</a:t>
+            </a:r>
+            <a:r>
+              <a:rPr lang="es-MX" dirty="0"/>
+              <a:t>[j-1][k-1]=matriz[j][k-1+a];</a:t>
+            </a:r>
+          </a:p>
+          <a:p>
+            <a:pPr marL="457200" lvl="1" indent="0">
+              <a:buNone/>
+            </a:pPr>
+            <a:r>
+              <a:rPr lang="es-MX" dirty="0"/>
               <a:t>				}</a:t>
             </a:r>
           </a:p>
@@ -20694,7 +21145,7 @@
               <a:buNone/>
             </a:pPr>
             <a:r>
-              <a:rPr lang="es-MX" dirty="0" smtClean="0"/>
+              <a:rPr lang="es-MX" dirty="0"/>
               <a:t>			}</a:t>
             </a:r>
           </a:p>
@@ -20704,41 +21155,41 @@
               <a:buNone/>
             </a:pPr>
             <a:r>
-              <a:rPr lang="es-MX" dirty="0" smtClean="0"/>
+              <a:rPr lang="es-MX" dirty="0"/>
               <a:t>		</a:t>
             </a:r>
             <a:r>
-              <a:rPr lang="es-MX" dirty="0" err="1" smtClean="0"/>
+              <a:rPr lang="es-MX" dirty="0" err="1"/>
               <a:t>aux</a:t>
             </a:r>
             <a:r>
-              <a:rPr lang="es-MX" dirty="0" smtClean="0"/>
+              <a:rPr lang="es-MX" dirty="0"/>
               <a:t>=</a:t>
             </a:r>
             <a:r>
-              <a:rPr lang="es-MX" dirty="0" err="1" smtClean="0"/>
+              <a:rPr lang="es-MX" dirty="0" err="1"/>
               <a:t>aux</a:t>
             </a:r>
             <a:r>
-              <a:rPr lang="es-MX" dirty="0" smtClean="0"/>
+              <a:rPr lang="es-MX" dirty="0"/>
               <a:t>+(-1)^(1+i)*matriz[0][i-1]*determinante(dimensión-1, </a:t>
             </a:r>
             <a:r>
-              <a:rPr lang="es-MX" dirty="0" err="1" smtClean="0"/>
+              <a:rPr lang="es-MX" dirty="0" err="1"/>
               <a:t>matrizAux</a:t>
             </a:r>
             <a:r>
-              <a:rPr lang="es-MX" dirty="0" smtClean="0"/>
+              <a:rPr lang="es-MX" dirty="0"/>
               <a:t>);</a:t>
             </a:r>
-            <a:endParaRPr lang="es-ES" dirty="0" smtClean="0"/>
+            <a:endParaRPr lang="es-ES" dirty="0"/>
           </a:p>
           <a:p>
             <a:pPr marL="457200" lvl="1" indent="0">
               <a:buFont typeface="Wingdings 3" charset="2"/>
               <a:buNone/>
             </a:pPr>
-            <a:endParaRPr lang="es-MX" dirty="0" smtClean="0"/>
+            <a:endParaRPr lang="es-MX" dirty="0"/>
           </a:p>
           <a:p>
             <a:pPr marL="457200" lvl="1" indent="0">
@@ -20746,7 +21197,7 @@
               <a:buNone/>
             </a:pPr>
             <a:r>
-              <a:rPr lang="es-MX" dirty="0" smtClean="0"/>
+              <a:rPr lang="es-MX" dirty="0"/>
               <a:t>	}</a:t>
             </a:r>
           </a:p>

</xml_diff>